<commit_message>
Box 1 figure cleanup and change to panel C
</commit_message>
<xml_diff>
--- a/manuscript/final_figures/Figure_Box1_PA_combined.pptx
+++ b/manuscript/final_figures/Figure_Box1_PA_combined.pptx
@@ -2,18 +2,18 @@
 <file path=ppt/presentation.xml><?xml version="1.0" encoding="utf-8"?>
 <p:presentation xmlns:a="http://schemas.openxmlformats.org/drawingml/2006/main" xmlns:r="http://schemas.openxmlformats.org/officeDocument/2006/relationships" xmlns:p="http://schemas.openxmlformats.org/presentationml/2006/main" saveSubsetFonts="1">
   <p:sldMasterIdLst>
-    <p:sldMasterId id="2147483648" r:id="rId1"/>
+    <p:sldMasterId id="2147483672" r:id="rId1"/>
   </p:sldMasterIdLst>
   <p:sldIdLst>
     <p:sldId id="256" r:id="rId2"/>
   </p:sldIdLst>
-  <p:sldSz cx="12192000" cy="6858000"/>
+  <p:sldSz cx="18470563" cy="15087600"/>
   <p:notesSz cx="6858000" cy="9144000"/>
   <p:defaultTextStyle>
     <a:defPPr>
       <a:defRPr lang="en-US"/>
     </a:defPPr>
-    <a:lvl1pPr marL="0" algn="l" defTabSz="914400" rtl="0" eaLnBrk="1" latinLnBrk="0" hangingPunct="1">
+    <a:lvl1pPr marL="0" algn="l" defTabSz="457200" rtl="0" eaLnBrk="1" latinLnBrk="0" hangingPunct="1">
       <a:defRPr sz="1800" kern="1200">
         <a:solidFill>
           <a:schemeClr val="tx1"/>
@@ -23,7 +23,7 @@
         <a:cs typeface="+mn-cs"/>
       </a:defRPr>
     </a:lvl1pPr>
-    <a:lvl2pPr marL="457200" algn="l" defTabSz="914400" rtl="0" eaLnBrk="1" latinLnBrk="0" hangingPunct="1">
+    <a:lvl2pPr marL="457200" algn="l" defTabSz="457200" rtl="0" eaLnBrk="1" latinLnBrk="0" hangingPunct="1">
       <a:defRPr sz="1800" kern="1200">
         <a:solidFill>
           <a:schemeClr val="tx1"/>
@@ -33,7 +33,7 @@
         <a:cs typeface="+mn-cs"/>
       </a:defRPr>
     </a:lvl2pPr>
-    <a:lvl3pPr marL="914400" algn="l" defTabSz="914400" rtl="0" eaLnBrk="1" latinLnBrk="0" hangingPunct="1">
+    <a:lvl3pPr marL="914400" algn="l" defTabSz="457200" rtl="0" eaLnBrk="1" latinLnBrk="0" hangingPunct="1">
       <a:defRPr sz="1800" kern="1200">
         <a:solidFill>
           <a:schemeClr val="tx1"/>
@@ -43,7 +43,7 @@
         <a:cs typeface="+mn-cs"/>
       </a:defRPr>
     </a:lvl3pPr>
-    <a:lvl4pPr marL="1371600" algn="l" defTabSz="914400" rtl="0" eaLnBrk="1" latinLnBrk="0" hangingPunct="1">
+    <a:lvl4pPr marL="1371600" algn="l" defTabSz="457200" rtl="0" eaLnBrk="1" latinLnBrk="0" hangingPunct="1">
       <a:defRPr sz="1800" kern="1200">
         <a:solidFill>
           <a:schemeClr val="tx1"/>
@@ -53,7 +53,7 @@
         <a:cs typeface="+mn-cs"/>
       </a:defRPr>
     </a:lvl4pPr>
-    <a:lvl5pPr marL="1828800" algn="l" defTabSz="914400" rtl="0" eaLnBrk="1" latinLnBrk="0" hangingPunct="1">
+    <a:lvl5pPr marL="1828800" algn="l" defTabSz="457200" rtl="0" eaLnBrk="1" latinLnBrk="0" hangingPunct="1">
       <a:defRPr sz="1800" kern="1200">
         <a:solidFill>
           <a:schemeClr val="tx1"/>
@@ -63,7 +63,7 @@
         <a:cs typeface="+mn-cs"/>
       </a:defRPr>
     </a:lvl5pPr>
-    <a:lvl6pPr marL="2286000" algn="l" defTabSz="914400" rtl="0" eaLnBrk="1" latinLnBrk="0" hangingPunct="1">
+    <a:lvl6pPr marL="2286000" algn="l" defTabSz="457200" rtl="0" eaLnBrk="1" latinLnBrk="0" hangingPunct="1">
       <a:defRPr sz="1800" kern="1200">
         <a:solidFill>
           <a:schemeClr val="tx1"/>
@@ -73,7 +73,7 @@
         <a:cs typeface="+mn-cs"/>
       </a:defRPr>
     </a:lvl6pPr>
-    <a:lvl7pPr marL="2743200" algn="l" defTabSz="914400" rtl="0" eaLnBrk="1" latinLnBrk="0" hangingPunct="1">
+    <a:lvl7pPr marL="2743200" algn="l" defTabSz="457200" rtl="0" eaLnBrk="1" latinLnBrk="0" hangingPunct="1">
       <a:defRPr sz="1800" kern="1200">
         <a:solidFill>
           <a:schemeClr val="tx1"/>
@@ -83,7 +83,7 @@
         <a:cs typeface="+mn-cs"/>
       </a:defRPr>
     </a:lvl7pPr>
-    <a:lvl8pPr marL="3200400" algn="l" defTabSz="914400" rtl="0" eaLnBrk="1" latinLnBrk="0" hangingPunct="1">
+    <a:lvl8pPr marL="3200400" algn="l" defTabSz="457200" rtl="0" eaLnBrk="1" latinLnBrk="0" hangingPunct="1">
       <a:defRPr sz="1800" kern="1200">
         <a:solidFill>
           <a:schemeClr val="tx1"/>
@@ -93,7 +93,7 @@
         <a:cs typeface="+mn-cs"/>
       </a:defRPr>
     </a:lvl8pPr>
-    <a:lvl9pPr marL="3657600" algn="l" defTabSz="914400" rtl="0" eaLnBrk="1" latinLnBrk="0" hangingPunct="1">
+    <a:lvl9pPr marL="3657600" algn="l" defTabSz="457200" rtl="0" eaLnBrk="1" latinLnBrk="0" hangingPunct="1">
       <a:defRPr sz="1800" kern="1200">
         <a:solidFill>
           <a:schemeClr val="tx1"/>
@@ -104,6 +104,11 @@
       </a:defRPr>
     </a:lvl9pPr>
   </p:defaultTextStyle>
+  <p:extLst>
+    <p:ext uri="{EFAFB233-063F-42B5-8137-9DF3F51BA10A}">
+      <p15:sldGuideLst xmlns:p15="http://schemas.microsoft.com/office/powerpoint/2012/main"/>
+    </p:ext>
+  </p:extLst>
 </p:presentation>
 </file>
 
@@ -126,13 +131,7 @@
       </p:grpSpPr>
       <p:sp>
         <p:nvSpPr>
-          <p:cNvPr id="2" name="Title 1">
-            <a:extLst>
-              <a:ext uri="{FF2B5EF4-FFF2-40B4-BE49-F238E27FC236}">
-                <a16:creationId xmlns:a16="http://schemas.microsoft.com/office/drawing/2014/main" id="{69DE880D-7F8F-CBC5-4358-D8252719A3F2}"/>
-              </a:ext>
-            </a:extLst>
-          </p:cNvPr>
+          <p:cNvPr id="2" name="Title 1"/>
           <p:cNvSpPr>
             <a:spLocks noGrp="1"/>
           </p:cNvSpPr>
@@ -142,15 +141,15 @@
         </p:nvSpPr>
         <p:spPr>
           <a:xfrm>
-            <a:off x="1524000" y="1122363"/>
-            <a:ext cx="9144000" cy="2387600"/>
+            <a:off x="1385292" y="2469199"/>
+            <a:ext cx="15699979" cy="5252720"/>
           </a:xfrm>
         </p:spPr>
         <p:txBody>
           <a:bodyPr anchor="b"/>
           <a:lstStyle>
             <a:lvl1pPr algn="ctr">
-              <a:defRPr sz="6000"/>
+              <a:defRPr sz="12120"/>
             </a:lvl1pPr>
           </a:lstStyle>
           <a:p>
@@ -158,18 +157,13 @@
               <a:rPr lang="en-US"/>
               <a:t>Click to edit Master title style</a:t>
             </a:r>
-          </a:p>
-        </p:txBody>
-      </p:sp>
-      <p:sp>
-        <p:nvSpPr>
-          <p:cNvPr id="3" name="Subtitle 2">
-            <a:extLst>
-              <a:ext uri="{FF2B5EF4-FFF2-40B4-BE49-F238E27FC236}">
-                <a16:creationId xmlns:a16="http://schemas.microsoft.com/office/drawing/2014/main" id="{2CFD413B-E136-FAE2-8C34-269A5783C381}"/>
-              </a:ext>
-            </a:extLst>
-          </p:cNvPr>
+            <a:endParaRPr lang="en-US" dirty="0"/>
+          </a:p>
+        </p:txBody>
+      </p:sp>
+      <p:sp>
+        <p:nvSpPr>
+          <p:cNvPr id="3" name="Subtitle 2"/>
           <p:cNvSpPr>
             <a:spLocks noGrp="1"/>
           </p:cNvSpPr>
@@ -179,8 +173,8 @@
         </p:nvSpPr>
         <p:spPr>
           <a:xfrm>
-            <a:off x="1524000" y="3602038"/>
-            <a:ext cx="9144000" cy="1655762"/>
+            <a:off x="2308821" y="7924484"/>
+            <a:ext cx="13852922" cy="3642676"/>
           </a:xfrm>
         </p:spPr>
         <p:txBody>
@@ -188,39 +182,39 @@
           <a:lstStyle>
             <a:lvl1pPr marL="0" indent="0" algn="ctr">
               <a:buNone/>
-              <a:defRPr sz="2400"/>
+              <a:defRPr sz="4848"/>
             </a:lvl1pPr>
-            <a:lvl2pPr marL="457200" indent="0" algn="ctr">
-              <a:buNone/>
-              <a:defRPr sz="2000"/>
+            <a:lvl2pPr marL="923544" indent="0" algn="ctr">
+              <a:buNone/>
+              <a:defRPr sz="4040"/>
             </a:lvl2pPr>
-            <a:lvl3pPr marL="914400" indent="0" algn="ctr">
-              <a:buNone/>
-              <a:defRPr sz="1800"/>
+            <a:lvl3pPr marL="1847088" indent="0" algn="ctr">
+              <a:buNone/>
+              <a:defRPr sz="3636"/>
             </a:lvl3pPr>
-            <a:lvl4pPr marL="1371600" indent="0" algn="ctr">
-              <a:buNone/>
-              <a:defRPr sz="1600"/>
+            <a:lvl4pPr marL="2770632" indent="0" algn="ctr">
+              <a:buNone/>
+              <a:defRPr sz="3232"/>
             </a:lvl4pPr>
-            <a:lvl5pPr marL="1828800" indent="0" algn="ctr">
-              <a:buNone/>
-              <a:defRPr sz="1600"/>
+            <a:lvl5pPr marL="3694176" indent="0" algn="ctr">
+              <a:buNone/>
+              <a:defRPr sz="3232"/>
             </a:lvl5pPr>
-            <a:lvl6pPr marL="2286000" indent="0" algn="ctr">
-              <a:buNone/>
-              <a:defRPr sz="1600"/>
+            <a:lvl6pPr marL="4617720" indent="0" algn="ctr">
+              <a:buNone/>
+              <a:defRPr sz="3232"/>
             </a:lvl6pPr>
-            <a:lvl7pPr marL="2743200" indent="0" algn="ctr">
-              <a:buNone/>
-              <a:defRPr sz="1600"/>
+            <a:lvl7pPr marL="5541264" indent="0" algn="ctr">
+              <a:buNone/>
+              <a:defRPr sz="3232"/>
             </a:lvl7pPr>
-            <a:lvl8pPr marL="3200400" indent="0" algn="ctr">
-              <a:buNone/>
-              <a:defRPr sz="1600"/>
+            <a:lvl8pPr marL="6464808" indent="0" algn="ctr">
+              <a:buNone/>
+              <a:defRPr sz="3232"/>
             </a:lvl8pPr>
-            <a:lvl9pPr marL="3657600" indent="0" algn="ctr">
-              <a:buNone/>
-              <a:defRPr sz="1600"/>
+            <a:lvl9pPr marL="7388352" indent="0" algn="ctr">
+              <a:buNone/>
+              <a:defRPr sz="3232"/>
             </a:lvl9pPr>
           </a:lstStyle>
           <a:p>
@@ -228,18 +222,13 @@
               <a:rPr lang="en-US"/>
               <a:t>Click to edit Master subtitle style</a:t>
             </a:r>
-          </a:p>
-        </p:txBody>
-      </p:sp>
-      <p:sp>
-        <p:nvSpPr>
-          <p:cNvPr id="4" name="Date Placeholder 3">
-            <a:extLst>
-              <a:ext uri="{FF2B5EF4-FFF2-40B4-BE49-F238E27FC236}">
-                <a16:creationId xmlns:a16="http://schemas.microsoft.com/office/drawing/2014/main" id="{7A43C894-F8A9-99C6-BEC0-C8EC089EC83A}"/>
-              </a:ext>
-            </a:extLst>
-          </p:cNvPr>
+            <a:endParaRPr lang="en-US" dirty="0"/>
+          </a:p>
+        </p:txBody>
+      </p:sp>
+      <p:sp>
+        <p:nvSpPr>
+          <p:cNvPr id="4" name="Date Placeholder 3"/>
           <p:cNvSpPr>
             <a:spLocks noGrp="1"/>
           </p:cNvSpPr>
@@ -254,7 +243,7 @@
           <a:p>
             <a:fld id="{9989B3A2-2388-44BE-9854-4BCC09CB1095}" type="datetimeFigureOut">
               <a:rPr lang="en-US" smtClean="0"/>
-              <a:t>12/8/2023</a:t>
+              <a:t>12/9/2023</a:t>
             </a:fld>
             <a:endParaRPr lang="en-US"/>
           </a:p>
@@ -262,13 +251,7 @@
       </p:sp>
       <p:sp>
         <p:nvSpPr>
-          <p:cNvPr id="5" name="Footer Placeholder 4">
-            <a:extLst>
-              <a:ext uri="{FF2B5EF4-FFF2-40B4-BE49-F238E27FC236}">
-                <a16:creationId xmlns:a16="http://schemas.microsoft.com/office/drawing/2014/main" id="{33FD208B-D6C0-15B7-EF7A-46B8368064FF}"/>
-              </a:ext>
-            </a:extLst>
-          </p:cNvPr>
+          <p:cNvPr id="5" name="Footer Placeholder 4"/>
           <p:cNvSpPr>
             <a:spLocks noGrp="1"/>
           </p:cNvSpPr>
@@ -287,13 +270,7 @@
       </p:sp>
       <p:sp>
         <p:nvSpPr>
-          <p:cNvPr id="6" name="Slide Number Placeholder 5">
-            <a:extLst>
-              <a:ext uri="{FF2B5EF4-FFF2-40B4-BE49-F238E27FC236}">
-                <a16:creationId xmlns:a16="http://schemas.microsoft.com/office/drawing/2014/main" id="{FD7AB1D8-CD9B-10F6-4C3D-46D6A2EBCD8E}"/>
-              </a:ext>
-            </a:extLst>
-          </p:cNvPr>
+          <p:cNvPr id="6" name="Slide Number Placeholder 5"/>
           <p:cNvSpPr>
             <a:spLocks noGrp="1"/>
           </p:cNvSpPr>
@@ -317,7 +294,7 @@
     </p:spTree>
     <p:extLst>
       <p:ext uri="{BB962C8B-B14F-4D97-AF65-F5344CB8AC3E}">
-        <p14:creationId xmlns:p14="http://schemas.microsoft.com/office/powerpoint/2010/main" val="2101227444"/>
+        <p14:creationId xmlns:p14="http://schemas.microsoft.com/office/powerpoint/2010/main" val="1900701429"/>
       </p:ext>
     </p:extLst>
   </p:cSld>
@@ -346,13 +323,7 @@
       </p:grpSpPr>
       <p:sp>
         <p:nvSpPr>
-          <p:cNvPr id="2" name="Title 1">
-            <a:extLst>
-              <a:ext uri="{FF2B5EF4-FFF2-40B4-BE49-F238E27FC236}">
-                <a16:creationId xmlns:a16="http://schemas.microsoft.com/office/drawing/2014/main" id="{938564DA-CA60-E0AB-0BDE-3EAC19779E82}"/>
-              </a:ext>
-            </a:extLst>
-          </p:cNvPr>
+          <p:cNvPr id="2" name="Title 1"/>
           <p:cNvSpPr>
             <a:spLocks noGrp="1"/>
           </p:cNvSpPr>
@@ -369,18 +340,13 @@
               <a:rPr lang="en-US"/>
               <a:t>Click to edit Master title style</a:t>
             </a:r>
-          </a:p>
-        </p:txBody>
-      </p:sp>
-      <p:sp>
-        <p:nvSpPr>
-          <p:cNvPr id="3" name="Vertical Text Placeholder 2">
-            <a:extLst>
-              <a:ext uri="{FF2B5EF4-FFF2-40B4-BE49-F238E27FC236}">
-                <a16:creationId xmlns:a16="http://schemas.microsoft.com/office/drawing/2014/main" id="{B0AEB388-B0AB-51CF-815A-B0EDE61D802C}"/>
-              </a:ext>
-            </a:extLst>
-          </p:cNvPr>
+            <a:endParaRPr lang="en-US" dirty="0"/>
+          </a:p>
+        </p:txBody>
+      </p:sp>
+      <p:sp>
+        <p:nvSpPr>
+          <p:cNvPr id="3" name="Vertical Text Placeholder 2"/>
           <p:cNvSpPr>
             <a:spLocks noGrp="1"/>
           </p:cNvSpPr>
@@ -426,18 +392,13 @@
               <a:rPr lang="en-US"/>
               <a:t>Fifth level</a:t>
             </a:r>
-          </a:p>
-        </p:txBody>
-      </p:sp>
-      <p:sp>
-        <p:nvSpPr>
-          <p:cNvPr id="4" name="Date Placeholder 3">
-            <a:extLst>
-              <a:ext uri="{FF2B5EF4-FFF2-40B4-BE49-F238E27FC236}">
-                <a16:creationId xmlns:a16="http://schemas.microsoft.com/office/drawing/2014/main" id="{4333F027-D6D1-9FBE-C1D9-46E7078B150D}"/>
-              </a:ext>
-            </a:extLst>
-          </p:cNvPr>
+            <a:endParaRPr lang="en-US" dirty="0"/>
+          </a:p>
+        </p:txBody>
+      </p:sp>
+      <p:sp>
+        <p:nvSpPr>
+          <p:cNvPr id="4" name="Date Placeholder 3"/>
           <p:cNvSpPr>
             <a:spLocks noGrp="1"/>
           </p:cNvSpPr>
@@ -452,7 +413,7 @@
           <a:p>
             <a:fld id="{9989B3A2-2388-44BE-9854-4BCC09CB1095}" type="datetimeFigureOut">
               <a:rPr lang="en-US" smtClean="0"/>
-              <a:t>12/8/2023</a:t>
+              <a:t>12/9/2023</a:t>
             </a:fld>
             <a:endParaRPr lang="en-US"/>
           </a:p>
@@ -460,13 +421,7 @@
       </p:sp>
       <p:sp>
         <p:nvSpPr>
-          <p:cNvPr id="5" name="Footer Placeholder 4">
-            <a:extLst>
-              <a:ext uri="{FF2B5EF4-FFF2-40B4-BE49-F238E27FC236}">
-                <a16:creationId xmlns:a16="http://schemas.microsoft.com/office/drawing/2014/main" id="{59326965-DCF1-E31C-BC22-4D19FE29C4D6}"/>
-              </a:ext>
-            </a:extLst>
-          </p:cNvPr>
+          <p:cNvPr id="5" name="Footer Placeholder 4"/>
           <p:cNvSpPr>
             <a:spLocks noGrp="1"/>
           </p:cNvSpPr>
@@ -485,13 +440,7 @@
       </p:sp>
       <p:sp>
         <p:nvSpPr>
-          <p:cNvPr id="6" name="Slide Number Placeholder 5">
-            <a:extLst>
-              <a:ext uri="{FF2B5EF4-FFF2-40B4-BE49-F238E27FC236}">
-                <a16:creationId xmlns:a16="http://schemas.microsoft.com/office/drawing/2014/main" id="{A6ED2C6C-2229-89E1-042D-5538A99B695E}"/>
-              </a:ext>
-            </a:extLst>
-          </p:cNvPr>
+          <p:cNvPr id="6" name="Slide Number Placeholder 5"/>
           <p:cNvSpPr>
             <a:spLocks noGrp="1"/>
           </p:cNvSpPr>
@@ -515,7 +464,7 @@
     </p:spTree>
     <p:extLst>
       <p:ext uri="{BB962C8B-B14F-4D97-AF65-F5344CB8AC3E}">
-        <p14:creationId xmlns:p14="http://schemas.microsoft.com/office/powerpoint/2010/main" val="3724605885"/>
+        <p14:creationId xmlns:p14="http://schemas.microsoft.com/office/powerpoint/2010/main" val="1423541537"/>
       </p:ext>
     </p:extLst>
   </p:cSld>
@@ -544,13 +493,7 @@
       </p:grpSpPr>
       <p:sp>
         <p:nvSpPr>
-          <p:cNvPr id="2" name="Vertical Title 1">
-            <a:extLst>
-              <a:ext uri="{FF2B5EF4-FFF2-40B4-BE49-F238E27FC236}">
-                <a16:creationId xmlns:a16="http://schemas.microsoft.com/office/drawing/2014/main" id="{C390CFBA-11A8-DA8B-AC4B-075D436C5D90}"/>
-              </a:ext>
-            </a:extLst>
-          </p:cNvPr>
+          <p:cNvPr id="2" name="Vertical Title 1"/>
           <p:cNvSpPr>
             <a:spLocks noGrp="1"/>
           </p:cNvSpPr>
@@ -560,8 +503,8 @@
         </p:nvSpPr>
         <p:spPr>
           <a:xfrm>
-            <a:off x="8724900" y="365125"/>
-            <a:ext cx="2628900" cy="5811838"/>
+            <a:off x="13217998" y="803275"/>
+            <a:ext cx="3982715" cy="12786044"/>
           </a:xfrm>
         </p:spPr>
         <p:txBody>
@@ -572,18 +515,13 @@
               <a:rPr lang="en-US"/>
               <a:t>Click to edit Master title style</a:t>
             </a:r>
-          </a:p>
-        </p:txBody>
-      </p:sp>
-      <p:sp>
-        <p:nvSpPr>
-          <p:cNvPr id="3" name="Vertical Text Placeholder 2">
-            <a:extLst>
-              <a:ext uri="{FF2B5EF4-FFF2-40B4-BE49-F238E27FC236}">
-                <a16:creationId xmlns:a16="http://schemas.microsoft.com/office/drawing/2014/main" id="{EBEF540B-944B-E696-F560-91000849D6C0}"/>
-              </a:ext>
-            </a:extLst>
-          </p:cNvPr>
+            <a:endParaRPr lang="en-US" dirty="0"/>
+          </a:p>
+        </p:txBody>
+      </p:sp>
+      <p:sp>
+        <p:nvSpPr>
+          <p:cNvPr id="3" name="Vertical Text Placeholder 2"/>
           <p:cNvSpPr>
             <a:spLocks noGrp="1"/>
           </p:cNvSpPr>
@@ -593,8 +531,8 @@
         </p:nvSpPr>
         <p:spPr>
           <a:xfrm>
-            <a:off x="838200" y="365125"/>
-            <a:ext cx="7734300" cy="5811838"/>
+            <a:off x="1269852" y="803275"/>
+            <a:ext cx="11717263" cy="12786044"/>
           </a:xfrm>
         </p:spPr>
         <p:txBody>
@@ -634,18 +572,13 @@
               <a:rPr lang="en-US"/>
               <a:t>Fifth level</a:t>
             </a:r>
-          </a:p>
-        </p:txBody>
-      </p:sp>
-      <p:sp>
-        <p:nvSpPr>
-          <p:cNvPr id="4" name="Date Placeholder 3">
-            <a:extLst>
-              <a:ext uri="{FF2B5EF4-FFF2-40B4-BE49-F238E27FC236}">
-                <a16:creationId xmlns:a16="http://schemas.microsoft.com/office/drawing/2014/main" id="{A36FE6B9-2738-C4FE-8428-51417C7C3F42}"/>
-              </a:ext>
-            </a:extLst>
-          </p:cNvPr>
+            <a:endParaRPr lang="en-US" dirty="0"/>
+          </a:p>
+        </p:txBody>
+      </p:sp>
+      <p:sp>
+        <p:nvSpPr>
+          <p:cNvPr id="4" name="Date Placeholder 3"/>
           <p:cNvSpPr>
             <a:spLocks noGrp="1"/>
           </p:cNvSpPr>
@@ -660,7 +593,7 @@
           <a:p>
             <a:fld id="{9989B3A2-2388-44BE-9854-4BCC09CB1095}" type="datetimeFigureOut">
               <a:rPr lang="en-US" smtClean="0"/>
-              <a:t>12/8/2023</a:t>
+              <a:t>12/9/2023</a:t>
             </a:fld>
             <a:endParaRPr lang="en-US"/>
           </a:p>
@@ -668,13 +601,7 @@
       </p:sp>
       <p:sp>
         <p:nvSpPr>
-          <p:cNvPr id="5" name="Footer Placeholder 4">
-            <a:extLst>
-              <a:ext uri="{FF2B5EF4-FFF2-40B4-BE49-F238E27FC236}">
-                <a16:creationId xmlns:a16="http://schemas.microsoft.com/office/drawing/2014/main" id="{D43612B0-EB45-22F8-FD07-969484306857}"/>
-              </a:ext>
-            </a:extLst>
-          </p:cNvPr>
+          <p:cNvPr id="5" name="Footer Placeholder 4"/>
           <p:cNvSpPr>
             <a:spLocks noGrp="1"/>
           </p:cNvSpPr>
@@ -693,13 +620,7 @@
       </p:sp>
       <p:sp>
         <p:nvSpPr>
-          <p:cNvPr id="6" name="Slide Number Placeholder 5">
-            <a:extLst>
-              <a:ext uri="{FF2B5EF4-FFF2-40B4-BE49-F238E27FC236}">
-                <a16:creationId xmlns:a16="http://schemas.microsoft.com/office/drawing/2014/main" id="{69BE4AB9-B908-B569-5F6A-D51919FC9BA1}"/>
-              </a:ext>
-            </a:extLst>
-          </p:cNvPr>
+          <p:cNvPr id="6" name="Slide Number Placeholder 5"/>
           <p:cNvSpPr>
             <a:spLocks noGrp="1"/>
           </p:cNvSpPr>
@@ -723,7 +644,7 @@
     </p:spTree>
     <p:extLst>
       <p:ext uri="{BB962C8B-B14F-4D97-AF65-F5344CB8AC3E}">
-        <p14:creationId xmlns:p14="http://schemas.microsoft.com/office/powerpoint/2010/main" val="1746429445"/>
+        <p14:creationId xmlns:p14="http://schemas.microsoft.com/office/powerpoint/2010/main" val="569265482"/>
       </p:ext>
     </p:extLst>
   </p:cSld>
@@ -752,13 +673,7 @@
       </p:grpSpPr>
       <p:sp>
         <p:nvSpPr>
-          <p:cNvPr id="2" name="Title 1">
-            <a:extLst>
-              <a:ext uri="{FF2B5EF4-FFF2-40B4-BE49-F238E27FC236}">
-                <a16:creationId xmlns:a16="http://schemas.microsoft.com/office/drawing/2014/main" id="{CBDA9E77-BF89-020C-4144-D63C3C782F26}"/>
-              </a:ext>
-            </a:extLst>
-          </p:cNvPr>
+          <p:cNvPr id="2" name="Title 1"/>
           <p:cNvSpPr>
             <a:spLocks noGrp="1"/>
           </p:cNvSpPr>
@@ -775,18 +690,13 @@
               <a:rPr lang="en-US"/>
               <a:t>Click to edit Master title style</a:t>
             </a:r>
-          </a:p>
-        </p:txBody>
-      </p:sp>
-      <p:sp>
-        <p:nvSpPr>
-          <p:cNvPr id="3" name="Content Placeholder 2">
-            <a:extLst>
-              <a:ext uri="{FF2B5EF4-FFF2-40B4-BE49-F238E27FC236}">
-                <a16:creationId xmlns:a16="http://schemas.microsoft.com/office/drawing/2014/main" id="{F6686E03-D3C4-511B-9B00-E4715F2F94DC}"/>
-              </a:ext>
-            </a:extLst>
-          </p:cNvPr>
+            <a:endParaRPr lang="en-US" dirty="0"/>
+          </a:p>
+        </p:txBody>
+      </p:sp>
+      <p:sp>
+        <p:nvSpPr>
+          <p:cNvPr id="3" name="Content Placeholder 2"/>
           <p:cNvSpPr>
             <a:spLocks noGrp="1"/>
           </p:cNvSpPr>
@@ -832,18 +742,13 @@
               <a:rPr lang="en-US"/>
               <a:t>Fifth level</a:t>
             </a:r>
-          </a:p>
-        </p:txBody>
-      </p:sp>
-      <p:sp>
-        <p:nvSpPr>
-          <p:cNvPr id="4" name="Date Placeholder 3">
-            <a:extLst>
-              <a:ext uri="{FF2B5EF4-FFF2-40B4-BE49-F238E27FC236}">
-                <a16:creationId xmlns:a16="http://schemas.microsoft.com/office/drawing/2014/main" id="{E0B6F4B6-7A63-46C6-5FF6-8B74DBF81C42}"/>
-              </a:ext>
-            </a:extLst>
-          </p:cNvPr>
+            <a:endParaRPr lang="en-US" dirty="0"/>
+          </a:p>
+        </p:txBody>
+      </p:sp>
+      <p:sp>
+        <p:nvSpPr>
+          <p:cNvPr id="4" name="Date Placeholder 3"/>
           <p:cNvSpPr>
             <a:spLocks noGrp="1"/>
           </p:cNvSpPr>
@@ -858,7 +763,7 @@
           <a:p>
             <a:fld id="{9989B3A2-2388-44BE-9854-4BCC09CB1095}" type="datetimeFigureOut">
               <a:rPr lang="en-US" smtClean="0"/>
-              <a:t>12/8/2023</a:t>
+              <a:t>12/9/2023</a:t>
             </a:fld>
             <a:endParaRPr lang="en-US"/>
           </a:p>
@@ -866,13 +771,7 @@
       </p:sp>
       <p:sp>
         <p:nvSpPr>
-          <p:cNvPr id="5" name="Footer Placeholder 4">
-            <a:extLst>
-              <a:ext uri="{FF2B5EF4-FFF2-40B4-BE49-F238E27FC236}">
-                <a16:creationId xmlns:a16="http://schemas.microsoft.com/office/drawing/2014/main" id="{0E092154-6FD3-F02E-99FE-BE736176F956}"/>
-              </a:ext>
-            </a:extLst>
-          </p:cNvPr>
+          <p:cNvPr id="5" name="Footer Placeholder 4"/>
           <p:cNvSpPr>
             <a:spLocks noGrp="1"/>
           </p:cNvSpPr>
@@ -891,13 +790,7 @@
       </p:sp>
       <p:sp>
         <p:nvSpPr>
-          <p:cNvPr id="6" name="Slide Number Placeholder 5">
-            <a:extLst>
-              <a:ext uri="{FF2B5EF4-FFF2-40B4-BE49-F238E27FC236}">
-                <a16:creationId xmlns:a16="http://schemas.microsoft.com/office/drawing/2014/main" id="{5E7057A3-19D8-9493-0812-ECA437824743}"/>
-              </a:ext>
-            </a:extLst>
-          </p:cNvPr>
+          <p:cNvPr id="6" name="Slide Number Placeholder 5"/>
           <p:cNvSpPr>
             <a:spLocks noGrp="1"/>
           </p:cNvSpPr>
@@ -921,7 +814,7 @@
     </p:spTree>
     <p:extLst>
       <p:ext uri="{BB962C8B-B14F-4D97-AF65-F5344CB8AC3E}">
-        <p14:creationId xmlns:p14="http://schemas.microsoft.com/office/powerpoint/2010/main" val="3916097433"/>
+        <p14:creationId xmlns:p14="http://schemas.microsoft.com/office/powerpoint/2010/main" val="1927022969"/>
       </p:ext>
     </p:extLst>
   </p:cSld>
@@ -950,13 +843,7 @@
       </p:grpSpPr>
       <p:sp>
         <p:nvSpPr>
-          <p:cNvPr id="2" name="Title 1">
-            <a:extLst>
-              <a:ext uri="{FF2B5EF4-FFF2-40B4-BE49-F238E27FC236}">
-                <a16:creationId xmlns:a16="http://schemas.microsoft.com/office/drawing/2014/main" id="{5EE78A63-0CD0-DB17-7830-01864A0990E4}"/>
-              </a:ext>
-            </a:extLst>
-          </p:cNvPr>
+          <p:cNvPr id="2" name="Title 1"/>
           <p:cNvSpPr>
             <a:spLocks noGrp="1"/>
           </p:cNvSpPr>
@@ -966,15 +853,15 @@
         </p:nvSpPr>
         <p:spPr>
           <a:xfrm>
-            <a:off x="831850" y="1709738"/>
-            <a:ext cx="10515600" cy="2852737"/>
+            <a:off x="1260232" y="3761427"/>
+            <a:ext cx="15930861" cy="6276021"/>
           </a:xfrm>
         </p:spPr>
         <p:txBody>
           <a:bodyPr anchor="b"/>
           <a:lstStyle>
             <a:lvl1pPr>
-              <a:defRPr sz="6000"/>
+              <a:defRPr sz="12120"/>
             </a:lvl1pPr>
           </a:lstStyle>
           <a:p>
@@ -982,18 +869,13 @@
               <a:rPr lang="en-US"/>
               <a:t>Click to edit Master title style</a:t>
             </a:r>
-          </a:p>
-        </p:txBody>
-      </p:sp>
-      <p:sp>
-        <p:nvSpPr>
-          <p:cNvPr id="3" name="Text Placeholder 2">
-            <a:extLst>
-              <a:ext uri="{FF2B5EF4-FFF2-40B4-BE49-F238E27FC236}">
-                <a16:creationId xmlns:a16="http://schemas.microsoft.com/office/drawing/2014/main" id="{1688B871-308E-964F-4C9E-FF22CDC73E98}"/>
-              </a:ext>
-            </a:extLst>
-          </p:cNvPr>
+            <a:endParaRPr lang="en-US" dirty="0"/>
+          </a:p>
+        </p:txBody>
+      </p:sp>
+      <p:sp>
+        <p:nvSpPr>
+          <p:cNvPr id="3" name="Text Placeholder 2"/>
           <p:cNvSpPr>
             <a:spLocks noGrp="1"/>
           </p:cNvSpPr>
@@ -1003,8 +885,8 @@
         </p:nvSpPr>
         <p:spPr>
           <a:xfrm>
-            <a:off x="831850" y="4589463"/>
-            <a:ext cx="10515600" cy="1500187"/>
+            <a:off x="1260232" y="10096822"/>
+            <a:ext cx="15930861" cy="3300411"/>
           </a:xfrm>
         </p:spPr>
         <p:txBody>
@@ -1012,17 +894,15 @@
           <a:lstStyle>
             <a:lvl1pPr marL="0" indent="0">
               <a:buNone/>
-              <a:defRPr sz="2400">
+              <a:defRPr sz="4848">
                 <a:solidFill>
-                  <a:schemeClr val="tx1">
-                    <a:tint val="75000"/>
-                  </a:schemeClr>
+                  <a:schemeClr val="tx1"/>
                 </a:solidFill>
               </a:defRPr>
             </a:lvl1pPr>
-            <a:lvl2pPr marL="457200" indent="0">
-              <a:buNone/>
-              <a:defRPr sz="2000">
+            <a:lvl2pPr marL="923544" indent="0">
+              <a:buNone/>
+              <a:defRPr sz="4040">
                 <a:solidFill>
                   <a:schemeClr val="tx1">
                     <a:tint val="75000"/>
@@ -1030,9 +910,9 @@
                 </a:solidFill>
               </a:defRPr>
             </a:lvl2pPr>
-            <a:lvl3pPr marL="914400" indent="0">
-              <a:buNone/>
-              <a:defRPr sz="1800">
+            <a:lvl3pPr marL="1847088" indent="0">
+              <a:buNone/>
+              <a:defRPr sz="3636">
                 <a:solidFill>
                   <a:schemeClr val="tx1">
                     <a:tint val="75000"/>
@@ -1040,9 +920,9 @@
                 </a:solidFill>
               </a:defRPr>
             </a:lvl3pPr>
-            <a:lvl4pPr marL="1371600" indent="0">
-              <a:buNone/>
-              <a:defRPr sz="1600">
+            <a:lvl4pPr marL="2770632" indent="0">
+              <a:buNone/>
+              <a:defRPr sz="3232">
                 <a:solidFill>
                   <a:schemeClr val="tx1">
                     <a:tint val="75000"/>
@@ -1050,9 +930,9 @@
                 </a:solidFill>
               </a:defRPr>
             </a:lvl4pPr>
-            <a:lvl5pPr marL="1828800" indent="0">
-              <a:buNone/>
-              <a:defRPr sz="1600">
+            <a:lvl5pPr marL="3694176" indent="0">
+              <a:buNone/>
+              <a:defRPr sz="3232">
                 <a:solidFill>
                   <a:schemeClr val="tx1">
                     <a:tint val="75000"/>
@@ -1060,9 +940,9 @@
                 </a:solidFill>
               </a:defRPr>
             </a:lvl5pPr>
-            <a:lvl6pPr marL="2286000" indent="0">
-              <a:buNone/>
-              <a:defRPr sz="1600">
+            <a:lvl6pPr marL="4617720" indent="0">
+              <a:buNone/>
+              <a:defRPr sz="3232">
                 <a:solidFill>
                   <a:schemeClr val="tx1">
                     <a:tint val="75000"/>
@@ -1070,9 +950,9 @@
                 </a:solidFill>
               </a:defRPr>
             </a:lvl6pPr>
-            <a:lvl7pPr marL="2743200" indent="0">
-              <a:buNone/>
-              <a:defRPr sz="1600">
+            <a:lvl7pPr marL="5541264" indent="0">
+              <a:buNone/>
+              <a:defRPr sz="3232">
                 <a:solidFill>
                   <a:schemeClr val="tx1">
                     <a:tint val="75000"/>
@@ -1080,9 +960,9 @@
                 </a:solidFill>
               </a:defRPr>
             </a:lvl7pPr>
-            <a:lvl8pPr marL="3200400" indent="0">
-              <a:buNone/>
-              <a:defRPr sz="1600">
+            <a:lvl8pPr marL="6464808" indent="0">
+              <a:buNone/>
+              <a:defRPr sz="3232">
                 <a:solidFill>
                   <a:schemeClr val="tx1">
                     <a:tint val="75000"/>
@@ -1090,9 +970,9 @@
                 </a:solidFill>
               </a:defRPr>
             </a:lvl8pPr>
-            <a:lvl9pPr marL="3657600" indent="0">
-              <a:buNone/>
-              <a:defRPr sz="1600">
+            <a:lvl9pPr marL="7388352" indent="0">
+              <a:buNone/>
+              <a:defRPr sz="3232">
                 <a:solidFill>
                   <a:schemeClr val="tx1">
                     <a:tint val="75000"/>
@@ -1112,13 +992,7 @@
       </p:sp>
       <p:sp>
         <p:nvSpPr>
-          <p:cNvPr id="4" name="Date Placeholder 3">
-            <a:extLst>
-              <a:ext uri="{FF2B5EF4-FFF2-40B4-BE49-F238E27FC236}">
-                <a16:creationId xmlns:a16="http://schemas.microsoft.com/office/drawing/2014/main" id="{AC3C900C-3F87-F333-79F4-707B4186BD80}"/>
-              </a:ext>
-            </a:extLst>
-          </p:cNvPr>
+          <p:cNvPr id="4" name="Date Placeholder 3"/>
           <p:cNvSpPr>
             <a:spLocks noGrp="1"/>
           </p:cNvSpPr>
@@ -1133,7 +1007,7 @@
           <a:p>
             <a:fld id="{9989B3A2-2388-44BE-9854-4BCC09CB1095}" type="datetimeFigureOut">
               <a:rPr lang="en-US" smtClean="0"/>
-              <a:t>12/8/2023</a:t>
+              <a:t>12/9/2023</a:t>
             </a:fld>
             <a:endParaRPr lang="en-US"/>
           </a:p>
@@ -1141,13 +1015,7 @@
       </p:sp>
       <p:sp>
         <p:nvSpPr>
-          <p:cNvPr id="5" name="Footer Placeholder 4">
-            <a:extLst>
-              <a:ext uri="{FF2B5EF4-FFF2-40B4-BE49-F238E27FC236}">
-                <a16:creationId xmlns:a16="http://schemas.microsoft.com/office/drawing/2014/main" id="{E5A0F994-8FFE-2465-6744-AF2D47AC8592}"/>
-              </a:ext>
-            </a:extLst>
-          </p:cNvPr>
+          <p:cNvPr id="5" name="Footer Placeholder 4"/>
           <p:cNvSpPr>
             <a:spLocks noGrp="1"/>
           </p:cNvSpPr>
@@ -1166,13 +1034,7 @@
       </p:sp>
       <p:sp>
         <p:nvSpPr>
-          <p:cNvPr id="6" name="Slide Number Placeholder 5">
-            <a:extLst>
-              <a:ext uri="{FF2B5EF4-FFF2-40B4-BE49-F238E27FC236}">
-                <a16:creationId xmlns:a16="http://schemas.microsoft.com/office/drawing/2014/main" id="{B0732BB9-4513-6D3F-22AD-9B0358F4489C}"/>
-              </a:ext>
-            </a:extLst>
-          </p:cNvPr>
+          <p:cNvPr id="6" name="Slide Number Placeholder 5"/>
           <p:cNvSpPr>
             <a:spLocks noGrp="1"/>
           </p:cNvSpPr>
@@ -1196,7 +1058,7 @@
     </p:spTree>
     <p:extLst>
       <p:ext uri="{BB962C8B-B14F-4D97-AF65-F5344CB8AC3E}">
-        <p14:creationId xmlns:p14="http://schemas.microsoft.com/office/powerpoint/2010/main" val="1601147275"/>
+        <p14:creationId xmlns:p14="http://schemas.microsoft.com/office/powerpoint/2010/main" val="4052721136"/>
       </p:ext>
     </p:extLst>
   </p:cSld>
@@ -1225,13 +1087,7 @@
       </p:grpSpPr>
       <p:sp>
         <p:nvSpPr>
-          <p:cNvPr id="2" name="Title 1">
-            <a:extLst>
-              <a:ext uri="{FF2B5EF4-FFF2-40B4-BE49-F238E27FC236}">
-                <a16:creationId xmlns:a16="http://schemas.microsoft.com/office/drawing/2014/main" id="{356975DA-CBC0-A403-DC8E-E05259A08FE3}"/>
-              </a:ext>
-            </a:extLst>
-          </p:cNvPr>
+          <p:cNvPr id="2" name="Title 1"/>
           <p:cNvSpPr>
             <a:spLocks noGrp="1"/>
           </p:cNvSpPr>
@@ -1248,18 +1104,13 @@
               <a:rPr lang="en-US"/>
               <a:t>Click to edit Master title style</a:t>
             </a:r>
-          </a:p>
-        </p:txBody>
-      </p:sp>
-      <p:sp>
-        <p:nvSpPr>
-          <p:cNvPr id="3" name="Content Placeholder 2">
-            <a:extLst>
-              <a:ext uri="{FF2B5EF4-FFF2-40B4-BE49-F238E27FC236}">
-                <a16:creationId xmlns:a16="http://schemas.microsoft.com/office/drawing/2014/main" id="{1F3155BD-58B5-6B3F-0C6F-2925BC12F102}"/>
-              </a:ext>
-            </a:extLst>
-          </p:cNvPr>
+            <a:endParaRPr lang="en-US" dirty="0"/>
+          </a:p>
+        </p:txBody>
+      </p:sp>
+      <p:sp>
+        <p:nvSpPr>
+          <p:cNvPr id="3" name="Content Placeholder 2"/>
           <p:cNvSpPr>
             <a:spLocks noGrp="1"/>
           </p:cNvSpPr>
@@ -1269,8 +1120,8 @@
         </p:nvSpPr>
         <p:spPr>
           <a:xfrm>
-            <a:off x="838200" y="1825625"/>
-            <a:ext cx="5181600" cy="4351338"/>
+            <a:off x="1269851" y="4016375"/>
+            <a:ext cx="7849989" cy="9572944"/>
           </a:xfrm>
         </p:spPr>
         <p:txBody>
@@ -1310,18 +1161,13 @@
               <a:rPr lang="en-US"/>
               <a:t>Fifth level</a:t>
             </a:r>
-          </a:p>
-        </p:txBody>
-      </p:sp>
-      <p:sp>
-        <p:nvSpPr>
-          <p:cNvPr id="4" name="Content Placeholder 3">
-            <a:extLst>
-              <a:ext uri="{FF2B5EF4-FFF2-40B4-BE49-F238E27FC236}">
-                <a16:creationId xmlns:a16="http://schemas.microsoft.com/office/drawing/2014/main" id="{E023AB12-EFAA-FE3C-4330-9C467A4D11E5}"/>
-              </a:ext>
-            </a:extLst>
-          </p:cNvPr>
+            <a:endParaRPr lang="en-US" dirty="0"/>
+          </a:p>
+        </p:txBody>
+      </p:sp>
+      <p:sp>
+        <p:nvSpPr>
+          <p:cNvPr id="4" name="Content Placeholder 3"/>
           <p:cNvSpPr>
             <a:spLocks noGrp="1"/>
           </p:cNvSpPr>
@@ -1331,8 +1177,8 @@
         </p:nvSpPr>
         <p:spPr>
           <a:xfrm>
-            <a:off x="6172200" y="1825625"/>
-            <a:ext cx="5181600" cy="4351338"/>
+            <a:off x="9350723" y="4016375"/>
+            <a:ext cx="7849989" cy="9572944"/>
           </a:xfrm>
         </p:spPr>
         <p:txBody>
@@ -1372,18 +1218,13 @@
               <a:rPr lang="en-US"/>
               <a:t>Fifth level</a:t>
             </a:r>
-          </a:p>
-        </p:txBody>
-      </p:sp>
-      <p:sp>
-        <p:nvSpPr>
-          <p:cNvPr id="5" name="Date Placeholder 4">
-            <a:extLst>
-              <a:ext uri="{FF2B5EF4-FFF2-40B4-BE49-F238E27FC236}">
-                <a16:creationId xmlns:a16="http://schemas.microsoft.com/office/drawing/2014/main" id="{4CF5A7CF-37A9-E1EF-40C0-1987AFD51718}"/>
-              </a:ext>
-            </a:extLst>
-          </p:cNvPr>
+            <a:endParaRPr lang="en-US" dirty="0"/>
+          </a:p>
+        </p:txBody>
+      </p:sp>
+      <p:sp>
+        <p:nvSpPr>
+          <p:cNvPr id="5" name="Date Placeholder 4"/>
           <p:cNvSpPr>
             <a:spLocks noGrp="1"/>
           </p:cNvSpPr>
@@ -1398,7 +1239,7 @@
           <a:p>
             <a:fld id="{9989B3A2-2388-44BE-9854-4BCC09CB1095}" type="datetimeFigureOut">
               <a:rPr lang="en-US" smtClean="0"/>
-              <a:t>12/8/2023</a:t>
+              <a:t>12/9/2023</a:t>
             </a:fld>
             <a:endParaRPr lang="en-US"/>
           </a:p>
@@ -1406,13 +1247,7 @@
       </p:sp>
       <p:sp>
         <p:nvSpPr>
-          <p:cNvPr id="6" name="Footer Placeholder 5">
-            <a:extLst>
-              <a:ext uri="{FF2B5EF4-FFF2-40B4-BE49-F238E27FC236}">
-                <a16:creationId xmlns:a16="http://schemas.microsoft.com/office/drawing/2014/main" id="{D002B12D-958C-AB43-D722-1A4CADCFDCF5}"/>
-              </a:ext>
-            </a:extLst>
-          </p:cNvPr>
+          <p:cNvPr id="6" name="Footer Placeholder 5"/>
           <p:cNvSpPr>
             <a:spLocks noGrp="1"/>
           </p:cNvSpPr>
@@ -1431,13 +1266,7 @@
       </p:sp>
       <p:sp>
         <p:nvSpPr>
-          <p:cNvPr id="7" name="Slide Number Placeholder 6">
-            <a:extLst>
-              <a:ext uri="{FF2B5EF4-FFF2-40B4-BE49-F238E27FC236}">
-                <a16:creationId xmlns:a16="http://schemas.microsoft.com/office/drawing/2014/main" id="{E254DF83-5536-C901-752A-7FEBF2BD232B}"/>
-              </a:ext>
-            </a:extLst>
-          </p:cNvPr>
+          <p:cNvPr id="7" name="Slide Number Placeholder 6"/>
           <p:cNvSpPr>
             <a:spLocks noGrp="1"/>
           </p:cNvSpPr>
@@ -1461,7 +1290,7 @@
     </p:spTree>
     <p:extLst>
       <p:ext uri="{BB962C8B-B14F-4D97-AF65-F5344CB8AC3E}">
-        <p14:creationId xmlns:p14="http://schemas.microsoft.com/office/powerpoint/2010/main" val="2551347352"/>
+        <p14:creationId xmlns:p14="http://schemas.microsoft.com/office/powerpoint/2010/main" val="2579461958"/>
       </p:ext>
     </p:extLst>
   </p:cSld>
@@ -1490,13 +1319,7 @@
       </p:grpSpPr>
       <p:sp>
         <p:nvSpPr>
-          <p:cNvPr id="2" name="Title 1">
-            <a:extLst>
-              <a:ext uri="{FF2B5EF4-FFF2-40B4-BE49-F238E27FC236}">
-                <a16:creationId xmlns:a16="http://schemas.microsoft.com/office/drawing/2014/main" id="{2CE7DAFA-23B2-176D-195D-52277F2C0ED4}"/>
-              </a:ext>
-            </a:extLst>
-          </p:cNvPr>
+          <p:cNvPr id="2" name="Title 1"/>
           <p:cNvSpPr>
             <a:spLocks noGrp="1"/>
           </p:cNvSpPr>
@@ -1506,8 +1329,8 @@
         </p:nvSpPr>
         <p:spPr>
           <a:xfrm>
-            <a:off x="839788" y="365125"/>
-            <a:ext cx="10515600" cy="1325563"/>
+            <a:off x="1272257" y="803278"/>
+            <a:ext cx="15930861" cy="2916239"/>
           </a:xfrm>
         </p:spPr>
         <p:txBody>
@@ -1518,18 +1341,13 @@
               <a:rPr lang="en-US"/>
               <a:t>Click to edit Master title style</a:t>
             </a:r>
-          </a:p>
-        </p:txBody>
-      </p:sp>
-      <p:sp>
-        <p:nvSpPr>
-          <p:cNvPr id="3" name="Text Placeholder 2">
-            <a:extLst>
-              <a:ext uri="{FF2B5EF4-FFF2-40B4-BE49-F238E27FC236}">
-                <a16:creationId xmlns:a16="http://schemas.microsoft.com/office/drawing/2014/main" id="{C2FB8CE1-3C9A-9EF1-8184-16DFBA3AAA58}"/>
-              </a:ext>
-            </a:extLst>
-          </p:cNvPr>
+            <a:endParaRPr lang="en-US" dirty="0"/>
+          </a:p>
+        </p:txBody>
+      </p:sp>
+      <p:sp>
+        <p:nvSpPr>
+          <p:cNvPr id="3" name="Text Placeholder 2"/>
           <p:cNvSpPr>
             <a:spLocks noGrp="1"/>
           </p:cNvSpPr>
@@ -1539,8 +1357,8 @@
         </p:nvSpPr>
         <p:spPr>
           <a:xfrm>
-            <a:off x="839788" y="1681163"/>
-            <a:ext cx="5157787" cy="823912"/>
+            <a:off x="1272259" y="3698559"/>
+            <a:ext cx="7813913" cy="1812606"/>
           </a:xfrm>
         </p:spPr>
         <p:txBody>
@@ -1548,39 +1366,39 @@
           <a:lstStyle>
             <a:lvl1pPr marL="0" indent="0">
               <a:buNone/>
-              <a:defRPr sz="2400" b="1"/>
+              <a:defRPr sz="4848" b="1"/>
             </a:lvl1pPr>
-            <a:lvl2pPr marL="457200" indent="0">
-              <a:buNone/>
-              <a:defRPr sz="2000" b="1"/>
+            <a:lvl2pPr marL="923544" indent="0">
+              <a:buNone/>
+              <a:defRPr sz="4040" b="1"/>
             </a:lvl2pPr>
-            <a:lvl3pPr marL="914400" indent="0">
-              <a:buNone/>
-              <a:defRPr sz="1800" b="1"/>
+            <a:lvl3pPr marL="1847088" indent="0">
+              <a:buNone/>
+              <a:defRPr sz="3636" b="1"/>
             </a:lvl3pPr>
-            <a:lvl4pPr marL="1371600" indent="0">
-              <a:buNone/>
-              <a:defRPr sz="1600" b="1"/>
+            <a:lvl4pPr marL="2770632" indent="0">
+              <a:buNone/>
+              <a:defRPr sz="3232" b="1"/>
             </a:lvl4pPr>
-            <a:lvl5pPr marL="1828800" indent="0">
-              <a:buNone/>
-              <a:defRPr sz="1600" b="1"/>
+            <a:lvl5pPr marL="3694176" indent="0">
+              <a:buNone/>
+              <a:defRPr sz="3232" b="1"/>
             </a:lvl5pPr>
-            <a:lvl6pPr marL="2286000" indent="0">
-              <a:buNone/>
-              <a:defRPr sz="1600" b="1"/>
+            <a:lvl6pPr marL="4617720" indent="0">
+              <a:buNone/>
+              <a:defRPr sz="3232" b="1"/>
             </a:lvl6pPr>
-            <a:lvl7pPr marL="2743200" indent="0">
-              <a:buNone/>
-              <a:defRPr sz="1600" b="1"/>
+            <a:lvl7pPr marL="5541264" indent="0">
+              <a:buNone/>
+              <a:defRPr sz="3232" b="1"/>
             </a:lvl7pPr>
-            <a:lvl8pPr marL="3200400" indent="0">
-              <a:buNone/>
-              <a:defRPr sz="1600" b="1"/>
+            <a:lvl8pPr marL="6464808" indent="0">
+              <a:buNone/>
+              <a:defRPr sz="3232" b="1"/>
             </a:lvl8pPr>
-            <a:lvl9pPr marL="3657600" indent="0">
-              <a:buNone/>
-              <a:defRPr sz="1600" b="1"/>
+            <a:lvl9pPr marL="7388352" indent="0">
+              <a:buNone/>
+              <a:defRPr sz="3232" b="1"/>
             </a:lvl9pPr>
           </a:lstStyle>
           <a:p>
@@ -1594,13 +1412,7 @@
       </p:sp>
       <p:sp>
         <p:nvSpPr>
-          <p:cNvPr id="4" name="Content Placeholder 3">
-            <a:extLst>
-              <a:ext uri="{FF2B5EF4-FFF2-40B4-BE49-F238E27FC236}">
-                <a16:creationId xmlns:a16="http://schemas.microsoft.com/office/drawing/2014/main" id="{8B001611-CD55-2F70-1A70-8B816F31889B}"/>
-              </a:ext>
-            </a:extLst>
-          </p:cNvPr>
+          <p:cNvPr id="4" name="Content Placeholder 3"/>
           <p:cNvSpPr>
             <a:spLocks noGrp="1"/>
           </p:cNvSpPr>
@@ -1610,8 +1422,8 @@
         </p:nvSpPr>
         <p:spPr>
           <a:xfrm>
-            <a:off x="839788" y="2505075"/>
-            <a:ext cx="5157787" cy="3684588"/>
+            <a:off x="1272259" y="5511165"/>
+            <a:ext cx="7813913" cy="8106094"/>
           </a:xfrm>
         </p:spPr>
         <p:txBody>
@@ -1651,18 +1463,13 @@
               <a:rPr lang="en-US"/>
               <a:t>Fifth level</a:t>
             </a:r>
-          </a:p>
-        </p:txBody>
-      </p:sp>
-      <p:sp>
-        <p:nvSpPr>
-          <p:cNvPr id="5" name="Text Placeholder 4">
-            <a:extLst>
-              <a:ext uri="{FF2B5EF4-FFF2-40B4-BE49-F238E27FC236}">
-                <a16:creationId xmlns:a16="http://schemas.microsoft.com/office/drawing/2014/main" id="{22176532-9E8E-8EEA-3F03-EBBE1C38D7CD}"/>
-              </a:ext>
-            </a:extLst>
-          </p:cNvPr>
+            <a:endParaRPr lang="en-US" dirty="0"/>
+          </a:p>
+        </p:txBody>
+      </p:sp>
+      <p:sp>
+        <p:nvSpPr>
+          <p:cNvPr id="5" name="Text Placeholder 4"/>
           <p:cNvSpPr>
             <a:spLocks noGrp="1"/>
           </p:cNvSpPr>
@@ -1672,8 +1479,8 @@
         </p:nvSpPr>
         <p:spPr>
           <a:xfrm>
-            <a:off x="6172200" y="1681163"/>
-            <a:ext cx="5183188" cy="823912"/>
+            <a:off x="9350724" y="3698559"/>
+            <a:ext cx="7852395" cy="1812606"/>
           </a:xfrm>
         </p:spPr>
         <p:txBody>
@@ -1681,39 +1488,39 @@
           <a:lstStyle>
             <a:lvl1pPr marL="0" indent="0">
               <a:buNone/>
-              <a:defRPr sz="2400" b="1"/>
+              <a:defRPr sz="4848" b="1"/>
             </a:lvl1pPr>
-            <a:lvl2pPr marL="457200" indent="0">
-              <a:buNone/>
-              <a:defRPr sz="2000" b="1"/>
+            <a:lvl2pPr marL="923544" indent="0">
+              <a:buNone/>
+              <a:defRPr sz="4040" b="1"/>
             </a:lvl2pPr>
-            <a:lvl3pPr marL="914400" indent="0">
-              <a:buNone/>
-              <a:defRPr sz="1800" b="1"/>
+            <a:lvl3pPr marL="1847088" indent="0">
+              <a:buNone/>
+              <a:defRPr sz="3636" b="1"/>
             </a:lvl3pPr>
-            <a:lvl4pPr marL="1371600" indent="0">
-              <a:buNone/>
-              <a:defRPr sz="1600" b="1"/>
+            <a:lvl4pPr marL="2770632" indent="0">
+              <a:buNone/>
+              <a:defRPr sz="3232" b="1"/>
             </a:lvl4pPr>
-            <a:lvl5pPr marL="1828800" indent="0">
-              <a:buNone/>
-              <a:defRPr sz="1600" b="1"/>
+            <a:lvl5pPr marL="3694176" indent="0">
+              <a:buNone/>
+              <a:defRPr sz="3232" b="1"/>
             </a:lvl5pPr>
-            <a:lvl6pPr marL="2286000" indent="0">
-              <a:buNone/>
-              <a:defRPr sz="1600" b="1"/>
+            <a:lvl6pPr marL="4617720" indent="0">
+              <a:buNone/>
+              <a:defRPr sz="3232" b="1"/>
             </a:lvl6pPr>
-            <a:lvl7pPr marL="2743200" indent="0">
-              <a:buNone/>
-              <a:defRPr sz="1600" b="1"/>
+            <a:lvl7pPr marL="5541264" indent="0">
+              <a:buNone/>
+              <a:defRPr sz="3232" b="1"/>
             </a:lvl7pPr>
-            <a:lvl8pPr marL="3200400" indent="0">
-              <a:buNone/>
-              <a:defRPr sz="1600" b="1"/>
+            <a:lvl8pPr marL="6464808" indent="0">
+              <a:buNone/>
+              <a:defRPr sz="3232" b="1"/>
             </a:lvl8pPr>
-            <a:lvl9pPr marL="3657600" indent="0">
-              <a:buNone/>
-              <a:defRPr sz="1600" b="1"/>
+            <a:lvl9pPr marL="7388352" indent="0">
+              <a:buNone/>
+              <a:defRPr sz="3232" b="1"/>
             </a:lvl9pPr>
           </a:lstStyle>
           <a:p>
@@ -1727,13 +1534,7 @@
       </p:sp>
       <p:sp>
         <p:nvSpPr>
-          <p:cNvPr id="6" name="Content Placeholder 5">
-            <a:extLst>
-              <a:ext uri="{FF2B5EF4-FFF2-40B4-BE49-F238E27FC236}">
-                <a16:creationId xmlns:a16="http://schemas.microsoft.com/office/drawing/2014/main" id="{00815861-7EED-1A68-23E0-3F3618C42186}"/>
-              </a:ext>
-            </a:extLst>
-          </p:cNvPr>
+          <p:cNvPr id="6" name="Content Placeholder 5"/>
           <p:cNvSpPr>
             <a:spLocks noGrp="1"/>
           </p:cNvSpPr>
@@ -1743,8 +1544,8 @@
         </p:nvSpPr>
         <p:spPr>
           <a:xfrm>
-            <a:off x="6172200" y="2505075"/>
-            <a:ext cx="5183188" cy="3684588"/>
+            <a:off x="9350724" y="5511165"/>
+            <a:ext cx="7852395" cy="8106094"/>
           </a:xfrm>
         </p:spPr>
         <p:txBody>
@@ -1784,18 +1585,13 @@
               <a:rPr lang="en-US"/>
               <a:t>Fifth level</a:t>
             </a:r>
-          </a:p>
-        </p:txBody>
-      </p:sp>
-      <p:sp>
-        <p:nvSpPr>
-          <p:cNvPr id="7" name="Date Placeholder 6">
-            <a:extLst>
-              <a:ext uri="{FF2B5EF4-FFF2-40B4-BE49-F238E27FC236}">
-                <a16:creationId xmlns:a16="http://schemas.microsoft.com/office/drawing/2014/main" id="{C1BCB412-B234-BF8B-81E1-A80AD0025EE5}"/>
-              </a:ext>
-            </a:extLst>
-          </p:cNvPr>
+            <a:endParaRPr lang="en-US" dirty="0"/>
+          </a:p>
+        </p:txBody>
+      </p:sp>
+      <p:sp>
+        <p:nvSpPr>
+          <p:cNvPr id="7" name="Date Placeholder 6"/>
           <p:cNvSpPr>
             <a:spLocks noGrp="1"/>
           </p:cNvSpPr>
@@ -1810,7 +1606,7 @@
           <a:p>
             <a:fld id="{9989B3A2-2388-44BE-9854-4BCC09CB1095}" type="datetimeFigureOut">
               <a:rPr lang="en-US" smtClean="0"/>
-              <a:t>12/8/2023</a:t>
+              <a:t>12/9/2023</a:t>
             </a:fld>
             <a:endParaRPr lang="en-US"/>
           </a:p>
@@ -1818,13 +1614,7 @@
       </p:sp>
       <p:sp>
         <p:nvSpPr>
-          <p:cNvPr id="8" name="Footer Placeholder 7">
-            <a:extLst>
-              <a:ext uri="{FF2B5EF4-FFF2-40B4-BE49-F238E27FC236}">
-                <a16:creationId xmlns:a16="http://schemas.microsoft.com/office/drawing/2014/main" id="{93C0E300-3F2B-3995-B0EE-7ABAEE38B0AB}"/>
-              </a:ext>
-            </a:extLst>
-          </p:cNvPr>
+          <p:cNvPr id="8" name="Footer Placeholder 7"/>
           <p:cNvSpPr>
             <a:spLocks noGrp="1"/>
           </p:cNvSpPr>
@@ -1843,13 +1633,7 @@
       </p:sp>
       <p:sp>
         <p:nvSpPr>
-          <p:cNvPr id="9" name="Slide Number Placeholder 8">
-            <a:extLst>
-              <a:ext uri="{FF2B5EF4-FFF2-40B4-BE49-F238E27FC236}">
-                <a16:creationId xmlns:a16="http://schemas.microsoft.com/office/drawing/2014/main" id="{54DEDEEF-5FE0-1DE2-158B-4EC296E23ACE}"/>
-              </a:ext>
-            </a:extLst>
-          </p:cNvPr>
+          <p:cNvPr id="9" name="Slide Number Placeholder 8"/>
           <p:cNvSpPr>
             <a:spLocks noGrp="1"/>
           </p:cNvSpPr>
@@ -1873,7 +1657,7 @@
     </p:spTree>
     <p:extLst>
       <p:ext uri="{BB962C8B-B14F-4D97-AF65-F5344CB8AC3E}">
-        <p14:creationId xmlns:p14="http://schemas.microsoft.com/office/powerpoint/2010/main" val="15713220"/>
+        <p14:creationId xmlns:p14="http://schemas.microsoft.com/office/powerpoint/2010/main" val="521290829"/>
       </p:ext>
     </p:extLst>
   </p:cSld>
@@ -1902,13 +1686,7 @@
       </p:grpSpPr>
       <p:sp>
         <p:nvSpPr>
-          <p:cNvPr id="2" name="Title 1">
-            <a:extLst>
-              <a:ext uri="{FF2B5EF4-FFF2-40B4-BE49-F238E27FC236}">
-                <a16:creationId xmlns:a16="http://schemas.microsoft.com/office/drawing/2014/main" id="{472A276B-29CD-D0B4-F790-CE9BB9D792DF}"/>
-              </a:ext>
-            </a:extLst>
-          </p:cNvPr>
+          <p:cNvPr id="2" name="Title 1"/>
           <p:cNvSpPr>
             <a:spLocks noGrp="1"/>
           </p:cNvSpPr>
@@ -1925,18 +1703,13 @@
               <a:rPr lang="en-US"/>
               <a:t>Click to edit Master title style</a:t>
             </a:r>
-          </a:p>
-        </p:txBody>
-      </p:sp>
-      <p:sp>
-        <p:nvSpPr>
-          <p:cNvPr id="3" name="Date Placeholder 2">
-            <a:extLst>
-              <a:ext uri="{FF2B5EF4-FFF2-40B4-BE49-F238E27FC236}">
-                <a16:creationId xmlns:a16="http://schemas.microsoft.com/office/drawing/2014/main" id="{09EDB576-8A36-A9EA-FA2E-D4784A020295}"/>
-              </a:ext>
-            </a:extLst>
-          </p:cNvPr>
+            <a:endParaRPr lang="en-US" dirty="0"/>
+          </a:p>
+        </p:txBody>
+      </p:sp>
+      <p:sp>
+        <p:nvSpPr>
+          <p:cNvPr id="3" name="Date Placeholder 2"/>
           <p:cNvSpPr>
             <a:spLocks noGrp="1"/>
           </p:cNvSpPr>
@@ -1951,7 +1724,7 @@
           <a:p>
             <a:fld id="{9989B3A2-2388-44BE-9854-4BCC09CB1095}" type="datetimeFigureOut">
               <a:rPr lang="en-US" smtClean="0"/>
-              <a:t>12/8/2023</a:t>
+              <a:t>12/9/2023</a:t>
             </a:fld>
             <a:endParaRPr lang="en-US"/>
           </a:p>
@@ -1959,13 +1732,7 @@
       </p:sp>
       <p:sp>
         <p:nvSpPr>
-          <p:cNvPr id="4" name="Footer Placeholder 3">
-            <a:extLst>
-              <a:ext uri="{FF2B5EF4-FFF2-40B4-BE49-F238E27FC236}">
-                <a16:creationId xmlns:a16="http://schemas.microsoft.com/office/drawing/2014/main" id="{96B797B7-9D74-D0CE-DE55-BE14235FAC4F}"/>
-              </a:ext>
-            </a:extLst>
-          </p:cNvPr>
+          <p:cNvPr id="4" name="Footer Placeholder 3"/>
           <p:cNvSpPr>
             <a:spLocks noGrp="1"/>
           </p:cNvSpPr>
@@ -1984,13 +1751,7 @@
       </p:sp>
       <p:sp>
         <p:nvSpPr>
-          <p:cNvPr id="5" name="Slide Number Placeholder 4">
-            <a:extLst>
-              <a:ext uri="{FF2B5EF4-FFF2-40B4-BE49-F238E27FC236}">
-                <a16:creationId xmlns:a16="http://schemas.microsoft.com/office/drawing/2014/main" id="{DCDD80F6-BBA6-18C5-18E2-1A51C33F20A4}"/>
-              </a:ext>
-            </a:extLst>
-          </p:cNvPr>
+          <p:cNvPr id="5" name="Slide Number Placeholder 4"/>
           <p:cNvSpPr>
             <a:spLocks noGrp="1"/>
           </p:cNvSpPr>
@@ -2014,7 +1775,7 @@
     </p:spTree>
     <p:extLst>
       <p:ext uri="{BB962C8B-B14F-4D97-AF65-F5344CB8AC3E}">
-        <p14:creationId xmlns:p14="http://schemas.microsoft.com/office/powerpoint/2010/main" val="669139294"/>
+        <p14:creationId xmlns:p14="http://schemas.microsoft.com/office/powerpoint/2010/main" val="2873803401"/>
       </p:ext>
     </p:extLst>
   </p:cSld>
@@ -2043,13 +1804,7 @@
       </p:grpSpPr>
       <p:sp>
         <p:nvSpPr>
-          <p:cNvPr id="2" name="Date Placeholder 1">
-            <a:extLst>
-              <a:ext uri="{FF2B5EF4-FFF2-40B4-BE49-F238E27FC236}">
-                <a16:creationId xmlns:a16="http://schemas.microsoft.com/office/drawing/2014/main" id="{8E12B06C-FCAD-481B-E258-CCF138AEA324}"/>
-              </a:ext>
-            </a:extLst>
-          </p:cNvPr>
+          <p:cNvPr id="2" name="Date Placeholder 1"/>
           <p:cNvSpPr>
             <a:spLocks noGrp="1"/>
           </p:cNvSpPr>
@@ -2064,7 +1819,7 @@
           <a:p>
             <a:fld id="{9989B3A2-2388-44BE-9854-4BCC09CB1095}" type="datetimeFigureOut">
               <a:rPr lang="en-US" smtClean="0"/>
-              <a:t>12/8/2023</a:t>
+              <a:t>12/9/2023</a:t>
             </a:fld>
             <a:endParaRPr lang="en-US"/>
           </a:p>
@@ -2072,13 +1827,7 @@
       </p:sp>
       <p:sp>
         <p:nvSpPr>
-          <p:cNvPr id="3" name="Footer Placeholder 2">
-            <a:extLst>
-              <a:ext uri="{FF2B5EF4-FFF2-40B4-BE49-F238E27FC236}">
-                <a16:creationId xmlns:a16="http://schemas.microsoft.com/office/drawing/2014/main" id="{076A2CD1-EBDD-AB25-9818-26910AA43D2E}"/>
-              </a:ext>
-            </a:extLst>
-          </p:cNvPr>
+          <p:cNvPr id="3" name="Footer Placeholder 2"/>
           <p:cNvSpPr>
             <a:spLocks noGrp="1"/>
           </p:cNvSpPr>
@@ -2097,13 +1846,7 @@
       </p:sp>
       <p:sp>
         <p:nvSpPr>
-          <p:cNvPr id="4" name="Slide Number Placeholder 3">
-            <a:extLst>
-              <a:ext uri="{FF2B5EF4-FFF2-40B4-BE49-F238E27FC236}">
-                <a16:creationId xmlns:a16="http://schemas.microsoft.com/office/drawing/2014/main" id="{A4043889-8F88-52E5-71FC-80E405B08633}"/>
-              </a:ext>
-            </a:extLst>
-          </p:cNvPr>
+          <p:cNvPr id="4" name="Slide Number Placeholder 3"/>
           <p:cNvSpPr>
             <a:spLocks noGrp="1"/>
           </p:cNvSpPr>
@@ -2127,7 +1870,7 @@
     </p:spTree>
     <p:extLst>
       <p:ext uri="{BB962C8B-B14F-4D97-AF65-F5344CB8AC3E}">
-        <p14:creationId xmlns:p14="http://schemas.microsoft.com/office/powerpoint/2010/main" val="1153662385"/>
+        <p14:creationId xmlns:p14="http://schemas.microsoft.com/office/powerpoint/2010/main" val="1560532299"/>
       </p:ext>
     </p:extLst>
   </p:cSld>
@@ -2156,13 +1899,7 @@
       </p:grpSpPr>
       <p:sp>
         <p:nvSpPr>
-          <p:cNvPr id="2" name="Title 1">
-            <a:extLst>
-              <a:ext uri="{FF2B5EF4-FFF2-40B4-BE49-F238E27FC236}">
-                <a16:creationId xmlns:a16="http://schemas.microsoft.com/office/drawing/2014/main" id="{9C4D307C-A9E0-71DC-6B7B-62F4AB39F4A3}"/>
-              </a:ext>
-            </a:extLst>
-          </p:cNvPr>
+          <p:cNvPr id="2" name="Title 1"/>
           <p:cNvSpPr>
             <a:spLocks noGrp="1"/>
           </p:cNvSpPr>
@@ -2172,15 +1909,15 @@
         </p:nvSpPr>
         <p:spPr>
           <a:xfrm>
-            <a:off x="839788" y="457200"/>
-            <a:ext cx="3932237" cy="1600200"/>
+            <a:off x="1272257" y="1005840"/>
+            <a:ext cx="5957237" cy="3520440"/>
           </a:xfrm>
         </p:spPr>
         <p:txBody>
           <a:bodyPr anchor="b"/>
           <a:lstStyle>
             <a:lvl1pPr>
-              <a:defRPr sz="3200"/>
+              <a:defRPr sz="6464"/>
             </a:lvl1pPr>
           </a:lstStyle>
           <a:p>
@@ -2188,18 +1925,13 @@
               <a:rPr lang="en-US"/>
               <a:t>Click to edit Master title style</a:t>
             </a:r>
-          </a:p>
-        </p:txBody>
-      </p:sp>
-      <p:sp>
-        <p:nvSpPr>
-          <p:cNvPr id="3" name="Content Placeholder 2">
-            <a:extLst>
-              <a:ext uri="{FF2B5EF4-FFF2-40B4-BE49-F238E27FC236}">
-                <a16:creationId xmlns:a16="http://schemas.microsoft.com/office/drawing/2014/main" id="{870C71B3-E064-10D5-51BD-8C3BD9389AD6}"/>
-              </a:ext>
-            </a:extLst>
-          </p:cNvPr>
+            <a:endParaRPr lang="en-US" dirty="0"/>
+          </a:p>
+        </p:txBody>
+      </p:sp>
+      <p:sp>
+        <p:nvSpPr>
+          <p:cNvPr id="3" name="Content Placeholder 2"/>
           <p:cNvSpPr>
             <a:spLocks noGrp="1"/>
           </p:cNvSpPr>
@@ -2209,39 +1941,39 @@
         </p:nvSpPr>
         <p:spPr>
           <a:xfrm>
-            <a:off x="5183188" y="987425"/>
-            <a:ext cx="6172200" cy="4873625"/>
+            <a:off x="7852395" y="2172338"/>
+            <a:ext cx="9350723" cy="10721975"/>
           </a:xfrm>
         </p:spPr>
         <p:txBody>
           <a:bodyPr/>
           <a:lstStyle>
             <a:lvl1pPr>
-              <a:defRPr sz="3200"/>
+              <a:defRPr sz="6464"/>
             </a:lvl1pPr>
             <a:lvl2pPr>
-              <a:defRPr sz="2800"/>
+              <a:defRPr sz="5656"/>
             </a:lvl2pPr>
             <a:lvl3pPr>
-              <a:defRPr sz="2400"/>
+              <a:defRPr sz="4848"/>
             </a:lvl3pPr>
             <a:lvl4pPr>
-              <a:defRPr sz="2000"/>
+              <a:defRPr sz="4040"/>
             </a:lvl4pPr>
             <a:lvl5pPr>
-              <a:defRPr sz="2000"/>
+              <a:defRPr sz="4040"/>
             </a:lvl5pPr>
             <a:lvl6pPr>
-              <a:defRPr sz="2000"/>
+              <a:defRPr sz="4040"/>
             </a:lvl6pPr>
             <a:lvl7pPr>
-              <a:defRPr sz="2000"/>
+              <a:defRPr sz="4040"/>
             </a:lvl7pPr>
             <a:lvl8pPr>
-              <a:defRPr sz="2000"/>
+              <a:defRPr sz="4040"/>
             </a:lvl8pPr>
             <a:lvl9pPr>
-              <a:defRPr sz="2000"/>
+              <a:defRPr sz="4040"/>
             </a:lvl9pPr>
           </a:lstStyle>
           <a:p>
@@ -2278,18 +2010,13 @@
               <a:rPr lang="en-US"/>
               <a:t>Fifth level</a:t>
             </a:r>
-          </a:p>
-        </p:txBody>
-      </p:sp>
-      <p:sp>
-        <p:nvSpPr>
-          <p:cNvPr id="4" name="Text Placeholder 3">
-            <a:extLst>
-              <a:ext uri="{FF2B5EF4-FFF2-40B4-BE49-F238E27FC236}">
-                <a16:creationId xmlns:a16="http://schemas.microsoft.com/office/drawing/2014/main" id="{2E04C067-A372-D878-5F5A-F919EDE88D52}"/>
-              </a:ext>
-            </a:extLst>
-          </p:cNvPr>
+            <a:endParaRPr lang="en-US" dirty="0"/>
+          </a:p>
+        </p:txBody>
+      </p:sp>
+      <p:sp>
+        <p:nvSpPr>
+          <p:cNvPr id="4" name="Text Placeholder 3"/>
           <p:cNvSpPr>
             <a:spLocks noGrp="1"/>
           </p:cNvSpPr>
@@ -2299,8 +2026,8 @@
         </p:nvSpPr>
         <p:spPr>
           <a:xfrm>
-            <a:off x="839788" y="2057400"/>
-            <a:ext cx="3932237" cy="3811588"/>
+            <a:off x="1272257" y="4526280"/>
+            <a:ext cx="5957237" cy="8385494"/>
           </a:xfrm>
         </p:spPr>
         <p:txBody>
@@ -2308,39 +2035,39 @@
           <a:lstStyle>
             <a:lvl1pPr marL="0" indent="0">
               <a:buNone/>
-              <a:defRPr sz="1600"/>
+              <a:defRPr sz="3232"/>
             </a:lvl1pPr>
-            <a:lvl2pPr marL="457200" indent="0">
-              <a:buNone/>
-              <a:defRPr sz="1400"/>
+            <a:lvl2pPr marL="923544" indent="0">
+              <a:buNone/>
+              <a:defRPr sz="2828"/>
             </a:lvl2pPr>
-            <a:lvl3pPr marL="914400" indent="0">
-              <a:buNone/>
-              <a:defRPr sz="1200"/>
+            <a:lvl3pPr marL="1847088" indent="0">
+              <a:buNone/>
+              <a:defRPr sz="2424"/>
             </a:lvl3pPr>
-            <a:lvl4pPr marL="1371600" indent="0">
-              <a:buNone/>
-              <a:defRPr sz="1000"/>
+            <a:lvl4pPr marL="2770632" indent="0">
+              <a:buNone/>
+              <a:defRPr sz="2020"/>
             </a:lvl4pPr>
-            <a:lvl5pPr marL="1828800" indent="0">
-              <a:buNone/>
-              <a:defRPr sz="1000"/>
+            <a:lvl5pPr marL="3694176" indent="0">
+              <a:buNone/>
+              <a:defRPr sz="2020"/>
             </a:lvl5pPr>
-            <a:lvl6pPr marL="2286000" indent="0">
-              <a:buNone/>
-              <a:defRPr sz="1000"/>
+            <a:lvl6pPr marL="4617720" indent="0">
+              <a:buNone/>
+              <a:defRPr sz="2020"/>
             </a:lvl6pPr>
-            <a:lvl7pPr marL="2743200" indent="0">
-              <a:buNone/>
-              <a:defRPr sz="1000"/>
+            <a:lvl7pPr marL="5541264" indent="0">
+              <a:buNone/>
+              <a:defRPr sz="2020"/>
             </a:lvl7pPr>
-            <a:lvl8pPr marL="3200400" indent="0">
-              <a:buNone/>
-              <a:defRPr sz="1000"/>
+            <a:lvl8pPr marL="6464808" indent="0">
+              <a:buNone/>
+              <a:defRPr sz="2020"/>
             </a:lvl8pPr>
-            <a:lvl9pPr marL="3657600" indent="0">
-              <a:buNone/>
-              <a:defRPr sz="1000"/>
+            <a:lvl9pPr marL="7388352" indent="0">
+              <a:buNone/>
+              <a:defRPr sz="2020"/>
             </a:lvl9pPr>
           </a:lstStyle>
           <a:p>
@@ -2354,13 +2081,7 @@
       </p:sp>
       <p:sp>
         <p:nvSpPr>
-          <p:cNvPr id="5" name="Date Placeholder 4">
-            <a:extLst>
-              <a:ext uri="{FF2B5EF4-FFF2-40B4-BE49-F238E27FC236}">
-                <a16:creationId xmlns:a16="http://schemas.microsoft.com/office/drawing/2014/main" id="{D5C8FCBD-5ECF-60EF-E75C-E5806CAF2745}"/>
-              </a:ext>
-            </a:extLst>
-          </p:cNvPr>
+          <p:cNvPr id="5" name="Date Placeholder 4"/>
           <p:cNvSpPr>
             <a:spLocks noGrp="1"/>
           </p:cNvSpPr>
@@ -2375,7 +2096,7 @@
           <a:p>
             <a:fld id="{9989B3A2-2388-44BE-9854-4BCC09CB1095}" type="datetimeFigureOut">
               <a:rPr lang="en-US" smtClean="0"/>
-              <a:t>12/8/2023</a:t>
+              <a:t>12/9/2023</a:t>
             </a:fld>
             <a:endParaRPr lang="en-US"/>
           </a:p>
@@ -2383,13 +2104,7 @@
       </p:sp>
       <p:sp>
         <p:nvSpPr>
-          <p:cNvPr id="6" name="Footer Placeholder 5">
-            <a:extLst>
-              <a:ext uri="{FF2B5EF4-FFF2-40B4-BE49-F238E27FC236}">
-                <a16:creationId xmlns:a16="http://schemas.microsoft.com/office/drawing/2014/main" id="{2B63B6B7-B5F7-26F0-2D54-86D3B1C6BD22}"/>
-              </a:ext>
-            </a:extLst>
-          </p:cNvPr>
+          <p:cNvPr id="6" name="Footer Placeholder 5"/>
           <p:cNvSpPr>
             <a:spLocks noGrp="1"/>
           </p:cNvSpPr>
@@ -2408,13 +2123,7 @@
       </p:sp>
       <p:sp>
         <p:nvSpPr>
-          <p:cNvPr id="7" name="Slide Number Placeholder 6">
-            <a:extLst>
-              <a:ext uri="{FF2B5EF4-FFF2-40B4-BE49-F238E27FC236}">
-                <a16:creationId xmlns:a16="http://schemas.microsoft.com/office/drawing/2014/main" id="{73E4B007-90F3-B130-28EA-53699D0C6555}"/>
-              </a:ext>
-            </a:extLst>
-          </p:cNvPr>
+          <p:cNvPr id="7" name="Slide Number Placeholder 6"/>
           <p:cNvSpPr>
             <a:spLocks noGrp="1"/>
           </p:cNvSpPr>
@@ -2438,7 +2147,7 @@
     </p:spTree>
     <p:extLst>
       <p:ext uri="{BB962C8B-B14F-4D97-AF65-F5344CB8AC3E}">
-        <p14:creationId xmlns:p14="http://schemas.microsoft.com/office/powerpoint/2010/main" val="567414613"/>
+        <p14:creationId xmlns:p14="http://schemas.microsoft.com/office/powerpoint/2010/main" val="1541475944"/>
       </p:ext>
     </p:extLst>
   </p:cSld>
@@ -2467,13 +2176,7 @@
       </p:grpSpPr>
       <p:sp>
         <p:nvSpPr>
-          <p:cNvPr id="2" name="Title 1">
-            <a:extLst>
-              <a:ext uri="{FF2B5EF4-FFF2-40B4-BE49-F238E27FC236}">
-                <a16:creationId xmlns:a16="http://schemas.microsoft.com/office/drawing/2014/main" id="{D46E62A0-7851-3DE6-1345-EF73B4790577}"/>
-              </a:ext>
-            </a:extLst>
-          </p:cNvPr>
+          <p:cNvPr id="2" name="Title 1"/>
           <p:cNvSpPr>
             <a:spLocks noGrp="1"/>
           </p:cNvSpPr>
@@ -2483,15 +2186,15 @@
         </p:nvSpPr>
         <p:spPr>
           <a:xfrm>
-            <a:off x="839788" y="457200"/>
-            <a:ext cx="3932237" cy="1600200"/>
+            <a:off x="1272257" y="1005840"/>
+            <a:ext cx="5957237" cy="3520440"/>
           </a:xfrm>
         </p:spPr>
         <p:txBody>
           <a:bodyPr anchor="b"/>
           <a:lstStyle>
             <a:lvl1pPr>
-              <a:defRPr sz="3200"/>
+              <a:defRPr sz="6464"/>
             </a:lvl1pPr>
           </a:lstStyle>
           <a:p>
@@ -2499,20 +2202,15 @@
               <a:rPr lang="en-US"/>
               <a:t>Click to edit Master title style</a:t>
             </a:r>
-          </a:p>
-        </p:txBody>
-      </p:sp>
-      <p:sp>
-        <p:nvSpPr>
-          <p:cNvPr id="3" name="Picture Placeholder 2">
-            <a:extLst>
-              <a:ext uri="{FF2B5EF4-FFF2-40B4-BE49-F238E27FC236}">
-                <a16:creationId xmlns:a16="http://schemas.microsoft.com/office/drawing/2014/main" id="{F4ECE6E8-2370-B7F5-F25B-A7A526D549C5}"/>
-              </a:ext>
-            </a:extLst>
-          </p:cNvPr>
-          <p:cNvSpPr>
-            <a:spLocks noGrp="1"/>
+            <a:endParaRPr lang="en-US" dirty="0"/>
+          </a:p>
+        </p:txBody>
+      </p:sp>
+      <p:sp>
+        <p:nvSpPr>
+          <p:cNvPr id="3" name="Picture Placeholder 2"/>
+          <p:cNvSpPr>
+            <a:spLocks noGrp="1" noChangeAspect="1"/>
           </p:cNvSpPr>
           <p:nvPr>
             <p:ph type="pic" idx="1"/>
@@ -2520,64 +2218,62 @@
         </p:nvSpPr>
         <p:spPr>
           <a:xfrm>
-            <a:off x="5183188" y="987425"/>
-            <a:ext cx="6172200" cy="4873625"/>
+            <a:off x="7852395" y="2172338"/>
+            <a:ext cx="9350723" cy="10721975"/>
           </a:xfrm>
         </p:spPr>
         <p:txBody>
-          <a:bodyPr/>
+          <a:bodyPr anchor="t"/>
           <a:lstStyle>
             <a:lvl1pPr marL="0" indent="0">
               <a:buNone/>
-              <a:defRPr sz="3200"/>
+              <a:defRPr sz="6464"/>
             </a:lvl1pPr>
-            <a:lvl2pPr marL="457200" indent="0">
-              <a:buNone/>
-              <a:defRPr sz="2800"/>
+            <a:lvl2pPr marL="923544" indent="0">
+              <a:buNone/>
+              <a:defRPr sz="5656"/>
             </a:lvl2pPr>
-            <a:lvl3pPr marL="914400" indent="0">
-              <a:buNone/>
-              <a:defRPr sz="2400"/>
+            <a:lvl3pPr marL="1847088" indent="0">
+              <a:buNone/>
+              <a:defRPr sz="4848"/>
             </a:lvl3pPr>
-            <a:lvl4pPr marL="1371600" indent="0">
-              <a:buNone/>
-              <a:defRPr sz="2000"/>
+            <a:lvl4pPr marL="2770632" indent="0">
+              <a:buNone/>
+              <a:defRPr sz="4040"/>
             </a:lvl4pPr>
-            <a:lvl5pPr marL="1828800" indent="0">
-              <a:buNone/>
-              <a:defRPr sz="2000"/>
+            <a:lvl5pPr marL="3694176" indent="0">
+              <a:buNone/>
+              <a:defRPr sz="4040"/>
             </a:lvl5pPr>
-            <a:lvl6pPr marL="2286000" indent="0">
-              <a:buNone/>
-              <a:defRPr sz="2000"/>
+            <a:lvl6pPr marL="4617720" indent="0">
+              <a:buNone/>
+              <a:defRPr sz="4040"/>
             </a:lvl6pPr>
-            <a:lvl7pPr marL="2743200" indent="0">
-              <a:buNone/>
-              <a:defRPr sz="2000"/>
+            <a:lvl7pPr marL="5541264" indent="0">
+              <a:buNone/>
+              <a:defRPr sz="4040"/>
             </a:lvl7pPr>
-            <a:lvl8pPr marL="3200400" indent="0">
-              <a:buNone/>
-              <a:defRPr sz="2000"/>
+            <a:lvl8pPr marL="6464808" indent="0">
+              <a:buNone/>
+              <a:defRPr sz="4040"/>
             </a:lvl8pPr>
-            <a:lvl9pPr marL="3657600" indent="0">
-              <a:buNone/>
-              <a:defRPr sz="2000"/>
+            <a:lvl9pPr marL="7388352" indent="0">
+              <a:buNone/>
+              <a:defRPr sz="4040"/>
             </a:lvl9pPr>
           </a:lstStyle>
           <a:p>
-            <a:endParaRPr lang="en-US"/>
-          </a:p>
-        </p:txBody>
-      </p:sp>
-      <p:sp>
-        <p:nvSpPr>
-          <p:cNvPr id="4" name="Text Placeholder 3">
-            <a:extLst>
-              <a:ext uri="{FF2B5EF4-FFF2-40B4-BE49-F238E27FC236}">
-                <a16:creationId xmlns:a16="http://schemas.microsoft.com/office/drawing/2014/main" id="{7A79C740-B22B-3274-B241-ED70C6E19C70}"/>
-              </a:ext>
-            </a:extLst>
-          </p:cNvPr>
+            <a:r>
+              <a:rPr lang="en-US"/>
+              <a:t>Click icon to add picture</a:t>
+            </a:r>
+            <a:endParaRPr lang="en-US" dirty="0"/>
+          </a:p>
+        </p:txBody>
+      </p:sp>
+      <p:sp>
+        <p:nvSpPr>
+          <p:cNvPr id="4" name="Text Placeholder 3"/>
           <p:cNvSpPr>
             <a:spLocks noGrp="1"/>
           </p:cNvSpPr>
@@ -2587,8 +2283,8 @@
         </p:nvSpPr>
         <p:spPr>
           <a:xfrm>
-            <a:off x="839788" y="2057400"/>
-            <a:ext cx="3932237" cy="3811588"/>
+            <a:off x="1272257" y="4526280"/>
+            <a:ext cx="5957237" cy="8385494"/>
           </a:xfrm>
         </p:spPr>
         <p:txBody>
@@ -2596,39 +2292,39 @@
           <a:lstStyle>
             <a:lvl1pPr marL="0" indent="0">
               <a:buNone/>
-              <a:defRPr sz="1600"/>
+              <a:defRPr sz="3232"/>
             </a:lvl1pPr>
-            <a:lvl2pPr marL="457200" indent="0">
-              <a:buNone/>
-              <a:defRPr sz="1400"/>
+            <a:lvl2pPr marL="923544" indent="0">
+              <a:buNone/>
+              <a:defRPr sz="2828"/>
             </a:lvl2pPr>
-            <a:lvl3pPr marL="914400" indent="0">
-              <a:buNone/>
-              <a:defRPr sz="1200"/>
+            <a:lvl3pPr marL="1847088" indent="0">
+              <a:buNone/>
+              <a:defRPr sz="2424"/>
             </a:lvl3pPr>
-            <a:lvl4pPr marL="1371600" indent="0">
-              <a:buNone/>
-              <a:defRPr sz="1000"/>
+            <a:lvl4pPr marL="2770632" indent="0">
+              <a:buNone/>
+              <a:defRPr sz="2020"/>
             </a:lvl4pPr>
-            <a:lvl5pPr marL="1828800" indent="0">
-              <a:buNone/>
-              <a:defRPr sz="1000"/>
+            <a:lvl5pPr marL="3694176" indent="0">
+              <a:buNone/>
+              <a:defRPr sz="2020"/>
             </a:lvl5pPr>
-            <a:lvl6pPr marL="2286000" indent="0">
-              <a:buNone/>
-              <a:defRPr sz="1000"/>
+            <a:lvl6pPr marL="4617720" indent="0">
+              <a:buNone/>
+              <a:defRPr sz="2020"/>
             </a:lvl6pPr>
-            <a:lvl7pPr marL="2743200" indent="0">
-              <a:buNone/>
-              <a:defRPr sz="1000"/>
+            <a:lvl7pPr marL="5541264" indent="0">
+              <a:buNone/>
+              <a:defRPr sz="2020"/>
             </a:lvl7pPr>
-            <a:lvl8pPr marL="3200400" indent="0">
-              <a:buNone/>
-              <a:defRPr sz="1000"/>
+            <a:lvl8pPr marL="6464808" indent="0">
+              <a:buNone/>
+              <a:defRPr sz="2020"/>
             </a:lvl8pPr>
-            <a:lvl9pPr marL="3657600" indent="0">
-              <a:buNone/>
-              <a:defRPr sz="1000"/>
+            <a:lvl9pPr marL="7388352" indent="0">
+              <a:buNone/>
+              <a:defRPr sz="2020"/>
             </a:lvl9pPr>
           </a:lstStyle>
           <a:p>
@@ -2642,13 +2338,7 @@
       </p:sp>
       <p:sp>
         <p:nvSpPr>
-          <p:cNvPr id="5" name="Date Placeholder 4">
-            <a:extLst>
-              <a:ext uri="{FF2B5EF4-FFF2-40B4-BE49-F238E27FC236}">
-                <a16:creationId xmlns:a16="http://schemas.microsoft.com/office/drawing/2014/main" id="{F0234CD9-23C8-9B52-118C-FBB95C3C7DDD}"/>
-              </a:ext>
-            </a:extLst>
-          </p:cNvPr>
+          <p:cNvPr id="5" name="Date Placeholder 4"/>
           <p:cNvSpPr>
             <a:spLocks noGrp="1"/>
           </p:cNvSpPr>
@@ -2663,7 +2353,7 @@
           <a:p>
             <a:fld id="{9989B3A2-2388-44BE-9854-4BCC09CB1095}" type="datetimeFigureOut">
               <a:rPr lang="en-US" smtClean="0"/>
-              <a:t>12/8/2023</a:t>
+              <a:t>12/9/2023</a:t>
             </a:fld>
             <a:endParaRPr lang="en-US"/>
           </a:p>
@@ -2671,13 +2361,7 @@
       </p:sp>
       <p:sp>
         <p:nvSpPr>
-          <p:cNvPr id="6" name="Footer Placeholder 5">
-            <a:extLst>
-              <a:ext uri="{FF2B5EF4-FFF2-40B4-BE49-F238E27FC236}">
-                <a16:creationId xmlns:a16="http://schemas.microsoft.com/office/drawing/2014/main" id="{7EABE169-EAD0-1823-2595-363A01A3ED24}"/>
-              </a:ext>
-            </a:extLst>
-          </p:cNvPr>
+          <p:cNvPr id="6" name="Footer Placeholder 5"/>
           <p:cNvSpPr>
             <a:spLocks noGrp="1"/>
           </p:cNvSpPr>
@@ -2696,13 +2380,7 @@
       </p:sp>
       <p:sp>
         <p:nvSpPr>
-          <p:cNvPr id="7" name="Slide Number Placeholder 6">
-            <a:extLst>
-              <a:ext uri="{FF2B5EF4-FFF2-40B4-BE49-F238E27FC236}">
-                <a16:creationId xmlns:a16="http://schemas.microsoft.com/office/drawing/2014/main" id="{B22BA371-A262-C55F-736F-8857ACE53B98}"/>
-              </a:ext>
-            </a:extLst>
-          </p:cNvPr>
+          <p:cNvPr id="7" name="Slide Number Placeholder 6"/>
           <p:cNvSpPr>
             <a:spLocks noGrp="1"/>
           </p:cNvSpPr>
@@ -2726,7 +2404,7 @@
     </p:spTree>
     <p:extLst>
       <p:ext uri="{BB962C8B-B14F-4D97-AF65-F5344CB8AC3E}">
-        <p14:creationId xmlns:p14="http://schemas.microsoft.com/office/powerpoint/2010/main" val="102557825"/>
+        <p14:creationId xmlns:p14="http://schemas.microsoft.com/office/powerpoint/2010/main" val="162472343"/>
       </p:ext>
     </p:extLst>
   </p:cSld>
@@ -2760,13 +2438,7 @@
       </p:grpSpPr>
       <p:sp>
         <p:nvSpPr>
-          <p:cNvPr id="2" name="Title Placeholder 1">
-            <a:extLst>
-              <a:ext uri="{FF2B5EF4-FFF2-40B4-BE49-F238E27FC236}">
-                <a16:creationId xmlns:a16="http://schemas.microsoft.com/office/drawing/2014/main" id="{17F8EB3B-0059-FFFC-2895-D49AF92CF905}"/>
-              </a:ext>
-            </a:extLst>
-          </p:cNvPr>
+          <p:cNvPr id="2" name="Title Placeholder 1"/>
           <p:cNvSpPr>
             <a:spLocks noGrp="1"/>
           </p:cNvSpPr>
@@ -2776,8 +2448,8 @@
         </p:nvSpPr>
         <p:spPr>
           <a:xfrm>
-            <a:off x="838200" y="365125"/>
-            <a:ext cx="10515600" cy="1325563"/>
+            <a:off x="1269851" y="803278"/>
+            <a:ext cx="15930861" cy="2916239"/>
           </a:xfrm>
           <a:prstGeom prst="rect">
             <a:avLst/>
@@ -2793,18 +2465,13 @@
               <a:rPr lang="en-US"/>
               <a:t>Click to edit Master title style</a:t>
             </a:r>
-          </a:p>
-        </p:txBody>
-      </p:sp>
-      <p:sp>
-        <p:nvSpPr>
-          <p:cNvPr id="3" name="Text Placeholder 2">
-            <a:extLst>
-              <a:ext uri="{FF2B5EF4-FFF2-40B4-BE49-F238E27FC236}">
-                <a16:creationId xmlns:a16="http://schemas.microsoft.com/office/drawing/2014/main" id="{FB5FD01C-5F57-914F-7498-A3362CB753AF}"/>
-              </a:ext>
-            </a:extLst>
-          </p:cNvPr>
+            <a:endParaRPr lang="en-US" dirty="0"/>
+          </a:p>
+        </p:txBody>
+      </p:sp>
+      <p:sp>
+        <p:nvSpPr>
+          <p:cNvPr id="3" name="Text Placeholder 2"/>
           <p:cNvSpPr>
             <a:spLocks noGrp="1"/>
           </p:cNvSpPr>
@@ -2814,8 +2481,8 @@
         </p:nvSpPr>
         <p:spPr>
           <a:xfrm>
-            <a:off x="838200" y="1825625"/>
-            <a:ext cx="10515600" cy="4351338"/>
+            <a:off x="1269851" y="4016375"/>
+            <a:ext cx="15930861" cy="9572944"/>
           </a:xfrm>
           <a:prstGeom prst="rect">
             <a:avLst/>
@@ -2860,18 +2527,13 @@
               <a:rPr lang="en-US"/>
               <a:t>Fifth level</a:t>
             </a:r>
-          </a:p>
-        </p:txBody>
-      </p:sp>
-      <p:sp>
-        <p:nvSpPr>
-          <p:cNvPr id="4" name="Date Placeholder 3">
-            <a:extLst>
-              <a:ext uri="{FF2B5EF4-FFF2-40B4-BE49-F238E27FC236}">
-                <a16:creationId xmlns:a16="http://schemas.microsoft.com/office/drawing/2014/main" id="{BE1D6807-AAE5-1116-012C-BF0479B2FBDD}"/>
-              </a:ext>
-            </a:extLst>
-          </p:cNvPr>
+            <a:endParaRPr lang="en-US" dirty="0"/>
+          </a:p>
+        </p:txBody>
+      </p:sp>
+      <p:sp>
+        <p:nvSpPr>
+          <p:cNvPr id="4" name="Date Placeholder 3"/>
           <p:cNvSpPr>
             <a:spLocks noGrp="1"/>
           </p:cNvSpPr>
@@ -2881,8 +2543,8 @@
         </p:nvSpPr>
         <p:spPr>
           <a:xfrm>
-            <a:off x="838200" y="6356350"/>
-            <a:ext cx="2743200" cy="365125"/>
+            <a:off x="1269851" y="13983973"/>
+            <a:ext cx="4155877" cy="803275"/>
           </a:xfrm>
           <a:prstGeom prst="rect">
             <a:avLst/>
@@ -2892,7 +2554,7 @@
           <a:bodyPr vert="horz" lIns="91440" tIns="45720" rIns="91440" bIns="45720" rtlCol="0" anchor="ctr"/>
           <a:lstStyle>
             <a:lvl1pPr algn="l">
-              <a:defRPr sz="1200">
+              <a:defRPr sz="2424">
                 <a:solidFill>
                   <a:schemeClr val="tx1">
                     <a:tint val="75000"/>
@@ -2904,7 +2566,7 @@
           <a:p>
             <a:fld id="{9989B3A2-2388-44BE-9854-4BCC09CB1095}" type="datetimeFigureOut">
               <a:rPr lang="en-US" smtClean="0"/>
-              <a:t>12/8/2023</a:t>
+              <a:t>12/9/2023</a:t>
             </a:fld>
             <a:endParaRPr lang="en-US"/>
           </a:p>
@@ -2912,13 +2574,7 @@
       </p:sp>
       <p:sp>
         <p:nvSpPr>
-          <p:cNvPr id="5" name="Footer Placeholder 4">
-            <a:extLst>
-              <a:ext uri="{FF2B5EF4-FFF2-40B4-BE49-F238E27FC236}">
-                <a16:creationId xmlns:a16="http://schemas.microsoft.com/office/drawing/2014/main" id="{7C09E0E7-EAF2-2A7D-E86D-8F3C45E6986E}"/>
-              </a:ext>
-            </a:extLst>
-          </p:cNvPr>
+          <p:cNvPr id="5" name="Footer Placeholder 4"/>
           <p:cNvSpPr>
             <a:spLocks noGrp="1"/>
           </p:cNvSpPr>
@@ -2928,8 +2584,8 @@
         </p:nvSpPr>
         <p:spPr>
           <a:xfrm>
-            <a:off x="4038600" y="6356350"/>
-            <a:ext cx="4114800" cy="365125"/>
+            <a:off x="6118374" y="13983973"/>
+            <a:ext cx="6233815" cy="803275"/>
           </a:xfrm>
           <a:prstGeom prst="rect">
             <a:avLst/>
@@ -2939,7 +2595,7 @@
           <a:bodyPr vert="horz" lIns="91440" tIns="45720" rIns="91440" bIns="45720" rtlCol="0" anchor="ctr"/>
           <a:lstStyle>
             <a:lvl1pPr algn="ctr">
-              <a:defRPr sz="1200">
+              <a:defRPr sz="2424">
                 <a:solidFill>
                   <a:schemeClr val="tx1">
                     <a:tint val="75000"/>
@@ -2955,13 +2611,7 @@
       </p:sp>
       <p:sp>
         <p:nvSpPr>
-          <p:cNvPr id="6" name="Slide Number Placeholder 5">
-            <a:extLst>
-              <a:ext uri="{FF2B5EF4-FFF2-40B4-BE49-F238E27FC236}">
-                <a16:creationId xmlns:a16="http://schemas.microsoft.com/office/drawing/2014/main" id="{65820C58-9A83-3661-EBDF-C61095FB6ABE}"/>
-              </a:ext>
-            </a:extLst>
-          </p:cNvPr>
+          <p:cNvPr id="6" name="Slide Number Placeholder 5"/>
           <p:cNvSpPr>
             <a:spLocks noGrp="1"/>
           </p:cNvSpPr>
@@ -2971,8 +2621,8 @@
         </p:nvSpPr>
         <p:spPr>
           <a:xfrm>
-            <a:off x="8610600" y="6356350"/>
-            <a:ext cx="2743200" cy="365125"/>
+            <a:off x="13044835" y="13983973"/>
+            <a:ext cx="4155877" cy="803275"/>
           </a:xfrm>
           <a:prstGeom prst="rect">
             <a:avLst/>
@@ -2982,7 +2632,7 @@
           <a:bodyPr vert="horz" lIns="91440" tIns="45720" rIns="91440" bIns="45720" rtlCol="0" anchor="ctr"/>
           <a:lstStyle>
             <a:lvl1pPr algn="r">
-              <a:defRPr sz="1200">
+              <a:defRPr sz="2424">
                 <a:solidFill>
                   <a:schemeClr val="tx1">
                     <a:tint val="75000"/>
@@ -3003,27 +2653,27 @@
     </p:spTree>
     <p:extLst>
       <p:ext uri="{BB962C8B-B14F-4D97-AF65-F5344CB8AC3E}">
-        <p14:creationId xmlns:p14="http://schemas.microsoft.com/office/powerpoint/2010/main" val="2860705836"/>
+        <p14:creationId xmlns:p14="http://schemas.microsoft.com/office/powerpoint/2010/main" val="1246474400"/>
       </p:ext>
     </p:extLst>
   </p:cSld>
   <p:clrMap bg1="lt1" tx1="dk1" bg2="lt2" tx2="dk2" accent1="accent1" accent2="accent2" accent3="accent3" accent4="accent4" accent5="accent5" accent6="accent6" hlink="hlink" folHlink="folHlink"/>
   <p:sldLayoutIdLst>
-    <p:sldLayoutId id="2147483649" r:id="rId1"/>
-    <p:sldLayoutId id="2147483650" r:id="rId2"/>
-    <p:sldLayoutId id="2147483651" r:id="rId3"/>
-    <p:sldLayoutId id="2147483652" r:id="rId4"/>
-    <p:sldLayoutId id="2147483653" r:id="rId5"/>
-    <p:sldLayoutId id="2147483654" r:id="rId6"/>
-    <p:sldLayoutId id="2147483655" r:id="rId7"/>
-    <p:sldLayoutId id="2147483656" r:id="rId8"/>
-    <p:sldLayoutId id="2147483657" r:id="rId9"/>
-    <p:sldLayoutId id="2147483658" r:id="rId10"/>
-    <p:sldLayoutId id="2147483659" r:id="rId11"/>
+    <p:sldLayoutId id="2147483673" r:id="rId1"/>
+    <p:sldLayoutId id="2147483674" r:id="rId2"/>
+    <p:sldLayoutId id="2147483675" r:id="rId3"/>
+    <p:sldLayoutId id="2147483676" r:id="rId4"/>
+    <p:sldLayoutId id="2147483677" r:id="rId5"/>
+    <p:sldLayoutId id="2147483678" r:id="rId6"/>
+    <p:sldLayoutId id="2147483679" r:id="rId7"/>
+    <p:sldLayoutId id="2147483680" r:id="rId8"/>
+    <p:sldLayoutId id="2147483681" r:id="rId9"/>
+    <p:sldLayoutId id="2147483682" r:id="rId10"/>
+    <p:sldLayoutId id="2147483683" r:id="rId11"/>
   </p:sldLayoutIdLst>
   <p:txStyles>
     <p:titleStyle>
-      <a:lvl1pPr algn="l" defTabSz="914400" rtl="0" eaLnBrk="1" latinLnBrk="0" hangingPunct="1">
+      <a:lvl1pPr algn="l" defTabSz="1847088" rtl="0" eaLnBrk="1" latinLnBrk="0" hangingPunct="1">
         <a:lnSpc>
           <a:spcPct val="90000"/>
         </a:lnSpc>
@@ -3031,7 +2681,7 @@
           <a:spcPct val="0"/>
         </a:spcBef>
         <a:buNone/>
-        <a:defRPr sz="4400" kern="1200">
+        <a:defRPr sz="8888" kern="1200">
           <a:solidFill>
             <a:schemeClr val="tx1"/>
           </a:solidFill>
@@ -3042,16 +2692,16 @@
       </a:lvl1pPr>
     </p:titleStyle>
     <p:bodyStyle>
-      <a:lvl1pPr marL="228600" indent="-228600" algn="l" defTabSz="914400" rtl="0" eaLnBrk="1" latinLnBrk="0" hangingPunct="1">
+      <a:lvl1pPr marL="461772" indent="-461772" algn="l" defTabSz="1847088" rtl="0" eaLnBrk="1" latinLnBrk="0" hangingPunct="1">
         <a:lnSpc>
           <a:spcPct val="90000"/>
         </a:lnSpc>
         <a:spcBef>
-          <a:spcPts val="1000"/>
+          <a:spcPts val="2020"/>
         </a:spcBef>
         <a:buFont typeface="Arial" panose="020B0604020202020204" pitchFamily="34" charset="0"/>
         <a:buChar char="•"/>
-        <a:defRPr sz="2800" kern="1200">
+        <a:defRPr sz="5656" kern="1200">
           <a:solidFill>
             <a:schemeClr val="tx1"/>
           </a:solidFill>
@@ -3060,16 +2710,16 @@
           <a:cs typeface="+mn-cs"/>
         </a:defRPr>
       </a:lvl1pPr>
-      <a:lvl2pPr marL="685800" indent="-228600" algn="l" defTabSz="914400" rtl="0" eaLnBrk="1" latinLnBrk="0" hangingPunct="1">
+      <a:lvl2pPr marL="1385316" indent="-461772" algn="l" defTabSz="1847088" rtl="0" eaLnBrk="1" latinLnBrk="0" hangingPunct="1">
         <a:lnSpc>
           <a:spcPct val="90000"/>
         </a:lnSpc>
         <a:spcBef>
-          <a:spcPts val="500"/>
+          <a:spcPts val="1010"/>
         </a:spcBef>
         <a:buFont typeface="Arial" panose="020B0604020202020204" pitchFamily="34" charset="0"/>
         <a:buChar char="•"/>
-        <a:defRPr sz="2400" kern="1200">
+        <a:defRPr sz="4848" kern="1200">
           <a:solidFill>
             <a:schemeClr val="tx1"/>
           </a:solidFill>
@@ -3078,16 +2728,16 @@
           <a:cs typeface="+mn-cs"/>
         </a:defRPr>
       </a:lvl2pPr>
-      <a:lvl3pPr marL="1143000" indent="-228600" algn="l" defTabSz="914400" rtl="0" eaLnBrk="1" latinLnBrk="0" hangingPunct="1">
+      <a:lvl3pPr marL="2308860" indent="-461772" algn="l" defTabSz="1847088" rtl="0" eaLnBrk="1" latinLnBrk="0" hangingPunct="1">
         <a:lnSpc>
           <a:spcPct val="90000"/>
         </a:lnSpc>
         <a:spcBef>
-          <a:spcPts val="500"/>
+          <a:spcPts val="1010"/>
         </a:spcBef>
         <a:buFont typeface="Arial" panose="020B0604020202020204" pitchFamily="34" charset="0"/>
         <a:buChar char="•"/>
-        <a:defRPr sz="2000" kern="1200">
+        <a:defRPr sz="4040" kern="1200">
           <a:solidFill>
             <a:schemeClr val="tx1"/>
           </a:solidFill>
@@ -3096,16 +2746,16 @@
           <a:cs typeface="+mn-cs"/>
         </a:defRPr>
       </a:lvl3pPr>
-      <a:lvl4pPr marL="1600200" indent="-228600" algn="l" defTabSz="914400" rtl="0" eaLnBrk="1" latinLnBrk="0" hangingPunct="1">
+      <a:lvl4pPr marL="3232404" indent="-461772" algn="l" defTabSz="1847088" rtl="0" eaLnBrk="1" latinLnBrk="0" hangingPunct="1">
         <a:lnSpc>
           <a:spcPct val="90000"/>
         </a:lnSpc>
         <a:spcBef>
-          <a:spcPts val="500"/>
+          <a:spcPts val="1010"/>
         </a:spcBef>
         <a:buFont typeface="Arial" panose="020B0604020202020204" pitchFamily="34" charset="0"/>
         <a:buChar char="•"/>
-        <a:defRPr sz="1800" kern="1200">
+        <a:defRPr sz="3636" kern="1200">
           <a:solidFill>
             <a:schemeClr val="tx1"/>
           </a:solidFill>
@@ -3114,16 +2764,16 @@
           <a:cs typeface="+mn-cs"/>
         </a:defRPr>
       </a:lvl4pPr>
-      <a:lvl5pPr marL="2057400" indent="-228600" algn="l" defTabSz="914400" rtl="0" eaLnBrk="1" latinLnBrk="0" hangingPunct="1">
+      <a:lvl5pPr marL="4155948" indent="-461772" algn="l" defTabSz="1847088" rtl="0" eaLnBrk="1" latinLnBrk="0" hangingPunct="1">
         <a:lnSpc>
           <a:spcPct val="90000"/>
         </a:lnSpc>
         <a:spcBef>
-          <a:spcPts val="500"/>
+          <a:spcPts val="1010"/>
         </a:spcBef>
         <a:buFont typeface="Arial" panose="020B0604020202020204" pitchFamily="34" charset="0"/>
         <a:buChar char="•"/>
-        <a:defRPr sz="1800" kern="1200">
+        <a:defRPr sz="3636" kern="1200">
           <a:solidFill>
             <a:schemeClr val="tx1"/>
           </a:solidFill>
@@ -3132,16 +2782,16 @@
           <a:cs typeface="+mn-cs"/>
         </a:defRPr>
       </a:lvl5pPr>
-      <a:lvl6pPr marL="2514600" indent="-228600" algn="l" defTabSz="914400" rtl="0" eaLnBrk="1" latinLnBrk="0" hangingPunct="1">
+      <a:lvl6pPr marL="5079492" indent="-461772" algn="l" defTabSz="1847088" rtl="0" eaLnBrk="1" latinLnBrk="0" hangingPunct="1">
         <a:lnSpc>
           <a:spcPct val="90000"/>
         </a:lnSpc>
         <a:spcBef>
-          <a:spcPts val="500"/>
+          <a:spcPts val="1010"/>
         </a:spcBef>
         <a:buFont typeface="Arial" panose="020B0604020202020204" pitchFamily="34" charset="0"/>
         <a:buChar char="•"/>
-        <a:defRPr sz="1800" kern="1200">
+        <a:defRPr sz="3636" kern="1200">
           <a:solidFill>
             <a:schemeClr val="tx1"/>
           </a:solidFill>
@@ -3150,16 +2800,16 @@
           <a:cs typeface="+mn-cs"/>
         </a:defRPr>
       </a:lvl6pPr>
-      <a:lvl7pPr marL="2971800" indent="-228600" algn="l" defTabSz="914400" rtl="0" eaLnBrk="1" latinLnBrk="0" hangingPunct="1">
+      <a:lvl7pPr marL="6003036" indent="-461772" algn="l" defTabSz="1847088" rtl="0" eaLnBrk="1" latinLnBrk="0" hangingPunct="1">
         <a:lnSpc>
           <a:spcPct val="90000"/>
         </a:lnSpc>
         <a:spcBef>
-          <a:spcPts val="500"/>
+          <a:spcPts val="1010"/>
         </a:spcBef>
         <a:buFont typeface="Arial" panose="020B0604020202020204" pitchFamily="34" charset="0"/>
         <a:buChar char="•"/>
-        <a:defRPr sz="1800" kern="1200">
+        <a:defRPr sz="3636" kern="1200">
           <a:solidFill>
             <a:schemeClr val="tx1"/>
           </a:solidFill>
@@ -3168,16 +2818,16 @@
           <a:cs typeface="+mn-cs"/>
         </a:defRPr>
       </a:lvl7pPr>
-      <a:lvl8pPr marL="3429000" indent="-228600" algn="l" defTabSz="914400" rtl="0" eaLnBrk="1" latinLnBrk="0" hangingPunct="1">
+      <a:lvl8pPr marL="6926580" indent="-461772" algn="l" defTabSz="1847088" rtl="0" eaLnBrk="1" latinLnBrk="0" hangingPunct="1">
         <a:lnSpc>
           <a:spcPct val="90000"/>
         </a:lnSpc>
         <a:spcBef>
-          <a:spcPts val="500"/>
+          <a:spcPts val="1010"/>
         </a:spcBef>
         <a:buFont typeface="Arial" panose="020B0604020202020204" pitchFamily="34" charset="0"/>
         <a:buChar char="•"/>
-        <a:defRPr sz="1800" kern="1200">
+        <a:defRPr sz="3636" kern="1200">
           <a:solidFill>
             <a:schemeClr val="tx1"/>
           </a:solidFill>
@@ -3186,16 +2836,16 @@
           <a:cs typeface="+mn-cs"/>
         </a:defRPr>
       </a:lvl8pPr>
-      <a:lvl9pPr marL="3886200" indent="-228600" algn="l" defTabSz="914400" rtl="0" eaLnBrk="1" latinLnBrk="0" hangingPunct="1">
+      <a:lvl9pPr marL="7850124" indent="-461772" algn="l" defTabSz="1847088" rtl="0" eaLnBrk="1" latinLnBrk="0" hangingPunct="1">
         <a:lnSpc>
           <a:spcPct val="90000"/>
         </a:lnSpc>
         <a:spcBef>
-          <a:spcPts val="500"/>
+          <a:spcPts val="1010"/>
         </a:spcBef>
         <a:buFont typeface="Arial" panose="020B0604020202020204" pitchFamily="34" charset="0"/>
         <a:buChar char="•"/>
-        <a:defRPr sz="1800" kern="1200">
+        <a:defRPr sz="3636" kern="1200">
           <a:solidFill>
             <a:schemeClr val="tx1"/>
           </a:solidFill>
@@ -3209,8 +2859,8 @@
       <a:defPPr>
         <a:defRPr lang="en-US"/>
       </a:defPPr>
-      <a:lvl1pPr marL="0" algn="l" defTabSz="914400" rtl="0" eaLnBrk="1" latinLnBrk="0" hangingPunct="1">
-        <a:defRPr sz="1800" kern="1200">
+      <a:lvl1pPr marL="0" algn="l" defTabSz="1847088" rtl="0" eaLnBrk="1" latinLnBrk="0" hangingPunct="1">
+        <a:defRPr sz="3636" kern="1200">
           <a:solidFill>
             <a:schemeClr val="tx1"/>
           </a:solidFill>
@@ -3219,8 +2869,8 @@
           <a:cs typeface="+mn-cs"/>
         </a:defRPr>
       </a:lvl1pPr>
-      <a:lvl2pPr marL="457200" algn="l" defTabSz="914400" rtl="0" eaLnBrk="1" latinLnBrk="0" hangingPunct="1">
-        <a:defRPr sz="1800" kern="1200">
+      <a:lvl2pPr marL="923544" algn="l" defTabSz="1847088" rtl="0" eaLnBrk="1" latinLnBrk="0" hangingPunct="1">
+        <a:defRPr sz="3636" kern="1200">
           <a:solidFill>
             <a:schemeClr val="tx1"/>
           </a:solidFill>
@@ -3229,8 +2879,8 @@
           <a:cs typeface="+mn-cs"/>
         </a:defRPr>
       </a:lvl2pPr>
-      <a:lvl3pPr marL="914400" algn="l" defTabSz="914400" rtl="0" eaLnBrk="1" latinLnBrk="0" hangingPunct="1">
-        <a:defRPr sz="1800" kern="1200">
+      <a:lvl3pPr marL="1847088" algn="l" defTabSz="1847088" rtl="0" eaLnBrk="1" latinLnBrk="0" hangingPunct="1">
+        <a:defRPr sz="3636" kern="1200">
           <a:solidFill>
             <a:schemeClr val="tx1"/>
           </a:solidFill>
@@ -3239,8 +2889,8 @@
           <a:cs typeface="+mn-cs"/>
         </a:defRPr>
       </a:lvl3pPr>
-      <a:lvl4pPr marL="1371600" algn="l" defTabSz="914400" rtl="0" eaLnBrk="1" latinLnBrk="0" hangingPunct="1">
-        <a:defRPr sz="1800" kern="1200">
+      <a:lvl4pPr marL="2770632" algn="l" defTabSz="1847088" rtl="0" eaLnBrk="1" latinLnBrk="0" hangingPunct="1">
+        <a:defRPr sz="3636" kern="1200">
           <a:solidFill>
             <a:schemeClr val="tx1"/>
           </a:solidFill>
@@ -3249,8 +2899,8 @@
           <a:cs typeface="+mn-cs"/>
         </a:defRPr>
       </a:lvl4pPr>
-      <a:lvl5pPr marL="1828800" algn="l" defTabSz="914400" rtl="0" eaLnBrk="1" latinLnBrk="0" hangingPunct="1">
-        <a:defRPr sz="1800" kern="1200">
+      <a:lvl5pPr marL="3694176" algn="l" defTabSz="1847088" rtl="0" eaLnBrk="1" latinLnBrk="0" hangingPunct="1">
+        <a:defRPr sz="3636" kern="1200">
           <a:solidFill>
             <a:schemeClr val="tx1"/>
           </a:solidFill>
@@ -3259,8 +2909,8 @@
           <a:cs typeface="+mn-cs"/>
         </a:defRPr>
       </a:lvl5pPr>
-      <a:lvl6pPr marL="2286000" algn="l" defTabSz="914400" rtl="0" eaLnBrk="1" latinLnBrk="0" hangingPunct="1">
-        <a:defRPr sz="1800" kern="1200">
+      <a:lvl6pPr marL="4617720" algn="l" defTabSz="1847088" rtl="0" eaLnBrk="1" latinLnBrk="0" hangingPunct="1">
+        <a:defRPr sz="3636" kern="1200">
           <a:solidFill>
             <a:schemeClr val="tx1"/>
           </a:solidFill>
@@ -3269,8 +2919,8 @@
           <a:cs typeface="+mn-cs"/>
         </a:defRPr>
       </a:lvl6pPr>
-      <a:lvl7pPr marL="2743200" algn="l" defTabSz="914400" rtl="0" eaLnBrk="1" latinLnBrk="0" hangingPunct="1">
-        <a:defRPr sz="1800" kern="1200">
+      <a:lvl7pPr marL="5541264" algn="l" defTabSz="1847088" rtl="0" eaLnBrk="1" latinLnBrk="0" hangingPunct="1">
+        <a:defRPr sz="3636" kern="1200">
           <a:solidFill>
             <a:schemeClr val="tx1"/>
           </a:solidFill>
@@ -3279,8 +2929,8 @@
           <a:cs typeface="+mn-cs"/>
         </a:defRPr>
       </a:lvl7pPr>
-      <a:lvl8pPr marL="3200400" algn="l" defTabSz="914400" rtl="0" eaLnBrk="1" latinLnBrk="0" hangingPunct="1">
-        <a:defRPr sz="1800" kern="1200">
+      <a:lvl8pPr marL="6464808" algn="l" defTabSz="1847088" rtl="0" eaLnBrk="1" latinLnBrk="0" hangingPunct="1">
+        <a:defRPr sz="3636" kern="1200">
           <a:solidFill>
             <a:schemeClr val="tx1"/>
           </a:solidFill>
@@ -3289,8 +2939,8 @@
           <a:cs typeface="+mn-cs"/>
         </a:defRPr>
       </a:lvl8pPr>
-      <a:lvl9pPr marL="3657600" algn="l" defTabSz="914400" rtl="0" eaLnBrk="1" latinLnBrk="0" hangingPunct="1">
-        <a:defRPr sz="1800" kern="1200">
+      <a:lvl9pPr marL="7388352" algn="l" defTabSz="1847088" rtl="0" eaLnBrk="1" latinLnBrk="0" hangingPunct="1">
+        <a:defRPr sz="3636" kern="1200">
           <a:solidFill>
             <a:schemeClr val="tx1"/>
           </a:solidFill>
@@ -3321,218 +2971,432 @@
           <a:chExt cx="0" cy="0"/>
         </a:xfrm>
       </p:grpSpPr>
-      <p:pic>
-        <p:nvPicPr>
-          <p:cNvPr id="18" name="Picture 17">
+      <p:grpSp>
+        <p:nvGrpSpPr>
+          <p:cNvPr id="25" name="Group 24">
             <a:extLst>
               <a:ext uri="{FF2B5EF4-FFF2-40B4-BE49-F238E27FC236}">
-                <a16:creationId xmlns:a16="http://schemas.microsoft.com/office/drawing/2014/main" id="{411A80AE-6E21-412D-2DF3-5FE09132A951}"/>
+                <a16:creationId xmlns:a16="http://schemas.microsoft.com/office/drawing/2014/main" id="{D1F2D3A0-F7DF-5982-8B0B-FC3BADC2C869}"/>
               </a:ext>
             </a:extLst>
           </p:cNvPr>
-          <p:cNvPicPr>
-            <a:picLocks noChangeAspect="1"/>
-          </p:cNvPicPr>
+          <p:cNvGrpSpPr/>
           <p:nvPr/>
-        </p:nvPicPr>
-        <p:blipFill>
-          <a:blip r:embed="rId2"/>
-          <a:stretch>
-            <a:fillRect/>
-          </a:stretch>
-        </p:blipFill>
-        <p:spPr>
+        </p:nvGrpSpPr>
+        <p:grpSpPr>
           <a:xfrm>
-            <a:off x="491297" y="0"/>
-            <a:ext cx="11209405" cy="6858000"/>
+            <a:off x="558817" y="954617"/>
+            <a:ext cx="17314566" cy="13519033"/>
+            <a:chOff x="556079" y="-110066"/>
+            <a:chExt cx="17229742" cy="13452803"/>
           </a:xfrm>
-          <a:prstGeom prst="rect">
-            <a:avLst/>
-          </a:prstGeom>
-        </p:spPr>
-      </p:pic>
-      <p:pic>
-        <p:nvPicPr>
-          <p:cNvPr id="20" name="Picture 19">
-            <a:extLst>
-              <a:ext uri="{FF2B5EF4-FFF2-40B4-BE49-F238E27FC236}">
-                <a16:creationId xmlns:a16="http://schemas.microsoft.com/office/drawing/2014/main" id="{B5CDF9E3-D2A6-7F92-2F05-B07EC190F35C}"/>
-              </a:ext>
-            </a:extLst>
-          </p:cNvPr>
-          <p:cNvPicPr>
-            <a:picLocks noChangeAspect="1"/>
-          </p:cNvPicPr>
-          <p:nvPr/>
-        </p:nvPicPr>
-        <p:blipFill rotWithShape="1">
-          <a:blip r:embed="rId2"/>
-          <a:srcRect l="12782" t="96296" r="83593" b="93"/>
-          <a:stretch/>
-        </p:blipFill>
-        <p:spPr>
-          <a:xfrm>
-            <a:off x="8547100" y="6610350"/>
-            <a:ext cx="406400" cy="247650"/>
-          </a:xfrm>
-          <a:prstGeom prst="rect">
-            <a:avLst/>
-          </a:prstGeom>
-        </p:spPr>
-      </p:pic>
-      <p:pic>
-        <p:nvPicPr>
-          <p:cNvPr id="22" name="Picture 21">
-            <a:extLst>
-              <a:ext uri="{FF2B5EF4-FFF2-40B4-BE49-F238E27FC236}">
-                <a16:creationId xmlns:a16="http://schemas.microsoft.com/office/drawing/2014/main" id="{860B0FC7-9579-8A13-6C92-20AA193D1264}"/>
-              </a:ext>
-            </a:extLst>
-          </p:cNvPr>
-          <p:cNvPicPr>
-            <a:picLocks noChangeAspect="1"/>
-          </p:cNvPicPr>
-          <p:nvPr/>
-        </p:nvPicPr>
-        <p:blipFill>
-          <a:blip r:embed="rId3"/>
-          <a:stretch>
-            <a:fillRect/>
-          </a:stretch>
-        </p:blipFill>
-        <p:spPr>
-          <a:xfrm>
-            <a:off x="7634713" y="4987457"/>
-            <a:ext cx="1039387" cy="1202885"/>
-          </a:xfrm>
-          <a:prstGeom prst="corner">
-            <a:avLst>
-              <a:gd name="adj1" fmla="val 50000"/>
-              <a:gd name="adj2" fmla="val 61608"/>
-            </a:avLst>
-          </a:prstGeom>
-        </p:spPr>
-      </p:pic>
-      <p:pic>
-        <p:nvPicPr>
-          <p:cNvPr id="30" name="Picture 29">
-            <a:extLst>
-              <a:ext uri="{FF2B5EF4-FFF2-40B4-BE49-F238E27FC236}">
-                <a16:creationId xmlns:a16="http://schemas.microsoft.com/office/drawing/2014/main" id="{2A204CC1-9247-9043-9421-6469DE0FDD4D}"/>
-              </a:ext>
-            </a:extLst>
-          </p:cNvPr>
-          <p:cNvPicPr>
-            <a:picLocks noChangeAspect="1"/>
-          </p:cNvPicPr>
-          <p:nvPr/>
-        </p:nvPicPr>
-        <p:blipFill>
-          <a:blip r:embed="rId4"/>
-          <a:stretch>
-            <a:fillRect/>
-          </a:stretch>
-        </p:blipFill>
-        <p:spPr>
-          <a:xfrm>
-            <a:off x="7917180" y="319324"/>
-            <a:ext cx="833120" cy="696667"/>
-          </a:xfrm>
-          <a:prstGeom prst="rect">
-            <a:avLst/>
-          </a:prstGeom>
-        </p:spPr>
-      </p:pic>
-      <p:pic>
-        <p:nvPicPr>
-          <p:cNvPr id="32" name="Picture 31">
-            <a:extLst>
-              <a:ext uri="{FF2B5EF4-FFF2-40B4-BE49-F238E27FC236}">
-                <a16:creationId xmlns:a16="http://schemas.microsoft.com/office/drawing/2014/main" id="{7C356589-1AA4-41A8-E1CC-DA7059BD4000}"/>
-              </a:ext>
-            </a:extLst>
-          </p:cNvPr>
-          <p:cNvPicPr>
-            <a:picLocks noChangeAspect="1"/>
-          </p:cNvPicPr>
-          <p:nvPr/>
-        </p:nvPicPr>
-        <p:blipFill>
-          <a:blip r:embed="rId5"/>
-          <a:stretch>
-            <a:fillRect/>
-          </a:stretch>
-        </p:blipFill>
-        <p:spPr>
-          <a:xfrm>
-            <a:off x="2204720" y="321346"/>
-            <a:ext cx="833120" cy="694645"/>
-          </a:xfrm>
-          <a:prstGeom prst="rect">
-            <a:avLst/>
-          </a:prstGeom>
-        </p:spPr>
-      </p:pic>
-      <p:pic>
-        <p:nvPicPr>
-          <p:cNvPr id="34" name="Picture 33">
-            <a:extLst>
-              <a:ext uri="{FF2B5EF4-FFF2-40B4-BE49-F238E27FC236}">
-                <a16:creationId xmlns:a16="http://schemas.microsoft.com/office/drawing/2014/main" id="{B99D52E5-88F3-258E-EF1A-5399BDE6841A}"/>
-              </a:ext>
-            </a:extLst>
-          </p:cNvPr>
-          <p:cNvPicPr>
-            <a:picLocks noChangeAspect="1"/>
-          </p:cNvPicPr>
-          <p:nvPr/>
-        </p:nvPicPr>
-        <p:blipFill>
-          <a:blip r:embed="rId6"/>
-          <a:stretch>
-            <a:fillRect/>
-          </a:stretch>
-        </p:blipFill>
-        <p:spPr>
-          <a:xfrm>
-            <a:off x="3497994" y="317302"/>
-            <a:ext cx="836611" cy="694645"/>
-          </a:xfrm>
-          <a:prstGeom prst="rect">
-            <a:avLst/>
-          </a:prstGeom>
-        </p:spPr>
-      </p:pic>
-      <p:pic>
-        <p:nvPicPr>
-          <p:cNvPr id="36" name="Picture 35">
-            <a:extLst>
-              <a:ext uri="{FF2B5EF4-FFF2-40B4-BE49-F238E27FC236}">
-                <a16:creationId xmlns:a16="http://schemas.microsoft.com/office/drawing/2014/main" id="{83B5222C-D90B-C5E4-E0D2-63BC160732F1}"/>
-              </a:ext>
-            </a:extLst>
-          </p:cNvPr>
-          <p:cNvPicPr>
-            <a:picLocks noChangeAspect="1"/>
-          </p:cNvPicPr>
-          <p:nvPr/>
-        </p:nvPicPr>
-        <p:blipFill>
-          <a:blip r:embed="rId7"/>
-          <a:stretch>
-            <a:fillRect/>
-          </a:stretch>
-        </p:blipFill>
-        <p:spPr>
-          <a:xfrm>
-            <a:off x="5834794" y="317302"/>
-            <a:ext cx="834939" cy="694645"/>
-          </a:xfrm>
-          <a:prstGeom prst="rect">
-            <a:avLst/>
-          </a:prstGeom>
-        </p:spPr>
-      </p:pic>
+        </p:grpSpPr>
+        <p:pic>
+          <p:nvPicPr>
+            <p:cNvPr id="13" name="Picture 12" descr="A collage of graphs and diagrams&#10;&#10;Description automatically generated">
+              <a:extLst>
+                <a:ext uri="{FF2B5EF4-FFF2-40B4-BE49-F238E27FC236}">
+                  <a16:creationId xmlns:a16="http://schemas.microsoft.com/office/drawing/2014/main" id="{50412086-C2E0-9960-6418-24520EFE753F}"/>
+                </a:ext>
+              </a:extLst>
+            </p:cNvPr>
+            <p:cNvPicPr>
+              <a:picLocks noChangeAspect="1"/>
+            </p:cNvPicPr>
+            <p:nvPr/>
+          </p:nvPicPr>
+          <p:blipFill>
+            <a:blip r:embed="rId2">
+              <a:extLst>
+                <a:ext uri="{28A0092B-C50C-407E-A947-70E740481C1C}">
+                  <a14:useLocalDpi xmlns:a14="http://schemas.microsoft.com/office/drawing/2010/main" val="0"/>
+                </a:ext>
+              </a:extLst>
+            </a:blip>
+            <a:stretch>
+              <a:fillRect/>
+            </a:stretch>
+          </p:blipFill>
+          <p:spPr>
+            <a:xfrm>
+              <a:off x="594254" y="0"/>
+              <a:ext cx="17191567" cy="12893675"/>
+            </a:xfrm>
+            <a:prstGeom prst="rect">
+              <a:avLst/>
+            </a:prstGeom>
+          </p:spPr>
+        </p:pic>
+        <p:grpSp>
+          <p:nvGrpSpPr>
+            <p:cNvPr id="9" name="Group 8">
+              <a:extLst>
+                <a:ext uri="{FF2B5EF4-FFF2-40B4-BE49-F238E27FC236}">
+                  <a16:creationId xmlns:a16="http://schemas.microsoft.com/office/drawing/2014/main" id="{E12D2797-8A2A-3484-1E16-619EE1E70CA3}"/>
+                </a:ext>
+              </a:extLst>
+            </p:cNvPr>
+            <p:cNvGrpSpPr/>
+            <p:nvPr/>
+          </p:nvGrpSpPr>
+          <p:grpSpPr>
+            <a:xfrm>
+              <a:off x="1481580" y="453179"/>
+              <a:ext cx="11444043" cy="5026329"/>
+              <a:chOff x="10504845" y="289668"/>
+              <a:chExt cx="11444043" cy="5026329"/>
+            </a:xfrm>
+          </p:grpSpPr>
+          <p:pic>
+            <p:nvPicPr>
+              <p:cNvPr id="22" name="Picture 21">
+                <a:extLst>
+                  <a:ext uri="{FF2B5EF4-FFF2-40B4-BE49-F238E27FC236}">
+                    <a16:creationId xmlns:a16="http://schemas.microsoft.com/office/drawing/2014/main" id="{860B0FC7-9579-8A13-6C92-20AA193D1264}"/>
+                  </a:ext>
+                </a:extLst>
+              </p:cNvPr>
+              <p:cNvPicPr>
+                <a:picLocks noChangeAspect="1"/>
+              </p:cNvPicPr>
+              <p:nvPr/>
+            </p:nvPicPr>
+            <p:blipFill>
+              <a:blip r:embed="rId3"/>
+              <a:stretch>
+                <a:fillRect/>
+              </a:stretch>
+            </p:blipFill>
+            <p:spPr>
+              <a:xfrm>
+                <a:off x="20493789" y="4113112"/>
+                <a:ext cx="1039387" cy="1202885"/>
+              </a:xfrm>
+              <a:prstGeom prst="corner">
+                <a:avLst>
+                  <a:gd name="adj1" fmla="val 50000"/>
+                  <a:gd name="adj2" fmla="val 61608"/>
+                </a:avLst>
+              </a:prstGeom>
+            </p:spPr>
+          </p:pic>
+          <p:pic>
+            <p:nvPicPr>
+              <p:cNvPr id="30" name="Picture 29">
+                <a:extLst>
+                  <a:ext uri="{FF2B5EF4-FFF2-40B4-BE49-F238E27FC236}">
+                    <a16:creationId xmlns:a16="http://schemas.microsoft.com/office/drawing/2014/main" id="{2A204CC1-9247-9043-9421-6469DE0FDD4D}"/>
+                  </a:ext>
+                </a:extLst>
+              </p:cNvPr>
+              <p:cNvPicPr>
+                <a:picLocks noChangeAspect="1"/>
+              </p:cNvPicPr>
+              <p:nvPr/>
+            </p:nvPicPr>
+            <p:blipFill>
+              <a:blip r:embed="rId4"/>
+              <a:stretch>
+                <a:fillRect/>
+              </a:stretch>
+            </p:blipFill>
+            <p:spPr>
+              <a:xfrm>
+                <a:off x="20876033" y="289668"/>
+                <a:ext cx="1072855" cy="897137"/>
+              </a:xfrm>
+              <a:prstGeom prst="rect">
+                <a:avLst/>
+              </a:prstGeom>
+            </p:spPr>
+          </p:pic>
+          <p:pic>
+            <p:nvPicPr>
+              <p:cNvPr id="32" name="Picture 31">
+                <a:extLst>
+                  <a:ext uri="{FF2B5EF4-FFF2-40B4-BE49-F238E27FC236}">
+                    <a16:creationId xmlns:a16="http://schemas.microsoft.com/office/drawing/2014/main" id="{7C356589-1AA4-41A8-E1CC-DA7059BD4000}"/>
+                  </a:ext>
+                </a:extLst>
+              </p:cNvPr>
+              <p:cNvPicPr>
+                <a:picLocks noChangeAspect="1"/>
+              </p:cNvPicPr>
+              <p:nvPr/>
+            </p:nvPicPr>
+            <p:blipFill>
+              <a:blip r:embed="rId5"/>
+              <a:stretch>
+                <a:fillRect/>
+              </a:stretch>
+            </p:blipFill>
+            <p:spPr>
+              <a:xfrm>
+                <a:off x="10504845" y="1539152"/>
+                <a:ext cx="772670" cy="644243"/>
+              </a:xfrm>
+              <a:prstGeom prst="rect">
+                <a:avLst/>
+              </a:prstGeom>
+            </p:spPr>
+          </p:pic>
+          <p:pic>
+            <p:nvPicPr>
+              <p:cNvPr id="34" name="Picture 33">
+                <a:extLst>
+                  <a:ext uri="{FF2B5EF4-FFF2-40B4-BE49-F238E27FC236}">
+                    <a16:creationId xmlns:a16="http://schemas.microsoft.com/office/drawing/2014/main" id="{B99D52E5-88F3-258E-EF1A-5399BDE6841A}"/>
+                  </a:ext>
+                </a:extLst>
+              </p:cNvPr>
+              <p:cNvPicPr>
+                <a:picLocks noChangeAspect="1"/>
+              </p:cNvPicPr>
+              <p:nvPr/>
+            </p:nvPicPr>
+            <p:blipFill>
+              <a:blip r:embed="rId6"/>
+              <a:stretch>
+                <a:fillRect/>
+              </a:stretch>
+            </p:blipFill>
+            <p:spPr>
+              <a:xfrm>
+                <a:off x="14137698" y="289670"/>
+                <a:ext cx="1080486" cy="897137"/>
+              </a:xfrm>
+              <a:prstGeom prst="rect">
+                <a:avLst/>
+              </a:prstGeom>
+            </p:spPr>
+          </p:pic>
+          <p:pic>
+            <p:nvPicPr>
+              <p:cNvPr id="36" name="Picture 35">
+                <a:extLst>
+                  <a:ext uri="{FF2B5EF4-FFF2-40B4-BE49-F238E27FC236}">
+                    <a16:creationId xmlns:a16="http://schemas.microsoft.com/office/drawing/2014/main" id="{83B5222C-D90B-C5E4-E0D2-63BC160732F1}"/>
+                  </a:ext>
+                </a:extLst>
+              </p:cNvPr>
+              <p:cNvPicPr>
+                <a:picLocks noChangeAspect="1"/>
+              </p:cNvPicPr>
+              <p:nvPr/>
+            </p:nvPicPr>
+            <p:blipFill>
+              <a:blip r:embed="rId7"/>
+              <a:stretch>
+                <a:fillRect/>
+              </a:stretch>
+            </p:blipFill>
+            <p:spPr>
+              <a:xfrm>
+                <a:off x="17643571" y="289669"/>
+                <a:ext cx="1080486" cy="898934"/>
+              </a:xfrm>
+              <a:prstGeom prst="rect">
+                <a:avLst/>
+              </a:prstGeom>
+            </p:spPr>
+          </p:pic>
+        </p:grpSp>
+        <p:sp>
+          <p:nvSpPr>
+            <p:cNvPr id="15" name="Rectangle 14">
+              <a:extLst>
+                <a:ext uri="{FF2B5EF4-FFF2-40B4-BE49-F238E27FC236}">
+                  <a16:creationId xmlns:a16="http://schemas.microsoft.com/office/drawing/2014/main" id="{CA13574B-638C-08CA-CE54-795AA0BA94BC}"/>
+                </a:ext>
+              </a:extLst>
+            </p:cNvPr>
+            <p:cNvSpPr/>
+            <p:nvPr/>
+          </p:nvSpPr>
+          <p:spPr>
+            <a:xfrm>
+              <a:off x="816429" y="6446837"/>
+              <a:ext cx="8193519" cy="4744175"/>
+            </a:xfrm>
+            <a:prstGeom prst="rect">
+              <a:avLst/>
+            </a:prstGeom>
+            <a:solidFill>
+              <a:schemeClr val="bg1"/>
+            </a:solidFill>
+            <a:ln>
+              <a:noFill/>
+            </a:ln>
+          </p:spPr>
+          <p:style>
+            <a:lnRef idx="2">
+              <a:schemeClr val="accent1">
+                <a:shade val="15000"/>
+              </a:schemeClr>
+            </a:lnRef>
+            <a:fillRef idx="1">
+              <a:schemeClr val="accent1"/>
+            </a:fillRef>
+            <a:effectRef idx="0">
+              <a:schemeClr val="accent1"/>
+            </a:effectRef>
+            <a:fontRef idx="minor">
+              <a:schemeClr val="lt1"/>
+            </a:fontRef>
+          </p:style>
+          <p:txBody>
+            <a:bodyPr rtlCol="0" anchor="ctr"/>
+            <a:lstStyle/>
+            <a:p>
+              <a:pPr algn="ctr"/>
+              <a:endParaRPr lang="en-US" sz="1940"/>
+            </a:p>
+          </p:txBody>
+        </p:sp>
+        <p:pic>
+          <p:nvPicPr>
+            <p:cNvPr id="14" name="Picture 13" descr="A collage of graphs and diagrams&#10;&#10;Description automatically generated">
+              <a:extLst>
+                <a:ext uri="{FF2B5EF4-FFF2-40B4-BE49-F238E27FC236}">
+                  <a16:creationId xmlns:a16="http://schemas.microsoft.com/office/drawing/2014/main" id="{9A0C49E0-0F14-FC0C-95D7-730B5087F375}"/>
+                </a:ext>
+              </a:extLst>
+            </p:cNvPr>
+            <p:cNvPicPr>
+              <a:picLocks noChangeAspect="1"/>
+            </p:cNvPicPr>
+            <p:nvPr/>
+          </p:nvPicPr>
+          <p:blipFill rotWithShape="1">
+            <a:blip r:embed="rId2">
+              <a:extLst>
+                <a:ext uri="{28A0092B-C50C-407E-A947-70E740481C1C}">
+                  <a14:useLocalDpi xmlns:a14="http://schemas.microsoft.com/office/drawing/2010/main" val="0"/>
+                </a:ext>
+              </a:extLst>
+            </a:blip>
+            <a:srcRect t="50000" r="51048"/>
+            <a:stretch/>
+          </p:blipFill>
+          <p:spPr>
+            <a:xfrm>
+              <a:off x="705341" y="6895899"/>
+              <a:ext cx="8415694" cy="6446838"/>
+            </a:xfrm>
+            <a:prstGeom prst="rect">
+              <a:avLst/>
+            </a:prstGeom>
+          </p:spPr>
+        </p:pic>
+        <p:sp>
+          <p:nvSpPr>
+            <p:cNvPr id="16" name="TextBox 15">
+              <a:extLst>
+                <a:ext uri="{FF2B5EF4-FFF2-40B4-BE49-F238E27FC236}">
+                  <a16:creationId xmlns:a16="http://schemas.microsoft.com/office/drawing/2014/main" id="{E7C502E1-8481-48BC-DA01-C0B61134A28D}"/>
+                </a:ext>
+              </a:extLst>
+            </p:cNvPr>
+            <p:cNvSpPr txBox="1"/>
+            <p:nvPr/>
+          </p:nvSpPr>
+          <p:spPr>
+            <a:xfrm>
+              <a:off x="556079" y="-110066"/>
+              <a:ext cx="520700" cy="707886"/>
+            </a:xfrm>
+            <a:prstGeom prst="rect">
+              <a:avLst/>
+            </a:prstGeom>
+            <a:noFill/>
+          </p:spPr>
+          <p:txBody>
+            <a:bodyPr wrap="square" rtlCol="0">
+              <a:spAutoFit/>
+            </a:bodyPr>
+            <a:lstStyle/>
+            <a:p>
+              <a:pPr algn="ctr"/>
+              <a:r>
+                <a:rPr lang="en-US" sz="4020" dirty="0"/>
+                <a:t>A</a:t>
+              </a:r>
+            </a:p>
+          </p:txBody>
+        </p:sp>
+        <p:sp>
+          <p:nvSpPr>
+            <p:cNvPr id="19" name="TextBox 18">
+              <a:extLst>
+                <a:ext uri="{FF2B5EF4-FFF2-40B4-BE49-F238E27FC236}">
+                  <a16:creationId xmlns:a16="http://schemas.microsoft.com/office/drawing/2014/main" id="{9EC1C235-9F4E-04F8-ED25-31E84C2CCE5C}"/>
+                </a:ext>
+              </a:extLst>
+            </p:cNvPr>
+            <p:cNvSpPr txBox="1"/>
+            <p:nvPr/>
+          </p:nvSpPr>
+          <p:spPr>
+            <a:xfrm>
+              <a:off x="9066396" y="6257994"/>
+              <a:ext cx="520700" cy="707886"/>
+            </a:xfrm>
+            <a:prstGeom prst="rect">
+              <a:avLst/>
+            </a:prstGeom>
+            <a:noFill/>
+          </p:spPr>
+          <p:txBody>
+            <a:bodyPr wrap="square" rtlCol="0">
+              <a:spAutoFit/>
+            </a:bodyPr>
+            <a:lstStyle/>
+            <a:p>
+              <a:pPr algn="ctr"/>
+              <a:r>
+                <a:rPr lang="en-US" sz="4020" dirty="0"/>
+                <a:t>C</a:t>
+              </a:r>
+            </a:p>
+          </p:txBody>
+        </p:sp>
+        <p:sp>
+          <p:nvSpPr>
+            <p:cNvPr id="21" name="TextBox 20">
+              <a:extLst>
+                <a:ext uri="{FF2B5EF4-FFF2-40B4-BE49-F238E27FC236}">
+                  <a16:creationId xmlns:a16="http://schemas.microsoft.com/office/drawing/2014/main" id="{3BC89755-5100-1D38-B52C-1A6F55FB9794}"/>
+                </a:ext>
+              </a:extLst>
+            </p:cNvPr>
+            <p:cNvSpPr txBox="1"/>
+            <p:nvPr/>
+          </p:nvSpPr>
+          <p:spPr>
+            <a:xfrm>
+              <a:off x="556079" y="6257994"/>
+              <a:ext cx="520700" cy="707886"/>
+            </a:xfrm>
+            <a:prstGeom prst="rect">
+              <a:avLst/>
+            </a:prstGeom>
+            <a:noFill/>
+          </p:spPr>
+          <p:txBody>
+            <a:bodyPr wrap="square" rtlCol="0">
+              <a:spAutoFit/>
+            </a:bodyPr>
+            <a:lstStyle/>
+            <a:p>
+              <a:pPr algn="ctr"/>
+              <a:r>
+                <a:rPr lang="en-US" sz="4020" dirty="0"/>
+                <a:t>B</a:t>
+              </a:r>
+            </a:p>
+          </p:txBody>
+        </p:sp>
+      </p:grpSp>
     </p:spTree>
     <p:extLst>
       <p:ext uri="{BB962C8B-B14F-4D97-AF65-F5344CB8AC3E}">
@@ -3549,7 +3413,7 @@
 <file path=ppt/theme/theme1.xml><?xml version="1.0" encoding="utf-8"?>
 <a:theme xmlns:a="http://schemas.openxmlformats.org/drawingml/2006/main" name="Office Theme">
   <a:themeElements>
-    <a:clrScheme name="Office">
+    <a:clrScheme name="Office Theme">
       <a:dk1>
         <a:sysClr val="windowText" lastClr="000000"/>
       </a:dk1>
@@ -3587,7 +3451,7 @@
         <a:srgbClr val="954F72"/>
       </a:folHlink>
     </a:clrScheme>
-    <a:fontScheme name="Office">
+    <a:fontScheme name="Office Theme">
       <a:majorFont>
         <a:latin typeface="Calibri Light" panose="020F0302020204030204"/>
         <a:ea typeface=""/>
@@ -3622,23 +3486,6 @@
         <a:font script="Viet" typeface="Times New Roman"/>
         <a:font script="Uigh" typeface="Microsoft Uighur"/>
         <a:font script="Geor" typeface="Sylfaen"/>
-        <a:font script="Armn" typeface="Arial"/>
-        <a:font script="Bugi" typeface="Leelawadee UI"/>
-        <a:font script="Bopo" typeface="Microsoft JhengHei"/>
-        <a:font script="Java" typeface="Javanese Text"/>
-        <a:font script="Lisu" typeface="Segoe UI"/>
-        <a:font script="Mymr" typeface="Myanmar Text"/>
-        <a:font script="Nkoo" typeface="Ebrima"/>
-        <a:font script="Olck" typeface="Nirmala UI"/>
-        <a:font script="Osma" typeface="Ebrima"/>
-        <a:font script="Phag" typeface="Phagspa"/>
-        <a:font script="Syrn" typeface="Estrangelo Edessa"/>
-        <a:font script="Syrj" typeface="Estrangelo Edessa"/>
-        <a:font script="Syre" typeface="Estrangelo Edessa"/>
-        <a:font script="Sora" typeface="Nirmala UI"/>
-        <a:font script="Tale" typeface="Microsoft Tai Le"/>
-        <a:font script="Talu" typeface="Microsoft New Tai Lue"/>
-        <a:font script="Tfng" typeface="Ebrima"/>
       </a:majorFont>
       <a:minorFont>
         <a:latin typeface="Calibri" panose="020F0502020204030204"/>
@@ -3674,26 +3521,9 @@
         <a:font script="Viet" typeface="Arial"/>
         <a:font script="Uigh" typeface="Microsoft Uighur"/>
         <a:font script="Geor" typeface="Sylfaen"/>
-        <a:font script="Armn" typeface="Arial"/>
-        <a:font script="Bugi" typeface="Leelawadee UI"/>
-        <a:font script="Bopo" typeface="Microsoft JhengHei"/>
-        <a:font script="Java" typeface="Javanese Text"/>
-        <a:font script="Lisu" typeface="Segoe UI"/>
-        <a:font script="Mymr" typeface="Myanmar Text"/>
-        <a:font script="Nkoo" typeface="Ebrima"/>
-        <a:font script="Olck" typeface="Nirmala UI"/>
-        <a:font script="Osma" typeface="Ebrima"/>
-        <a:font script="Phag" typeface="Phagspa"/>
-        <a:font script="Syrn" typeface="Estrangelo Edessa"/>
-        <a:font script="Syrj" typeface="Estrangelo Edessa"/>
-        <a:font script="Syre" typeface="Estrangelo Edessa"/>
-        <a:font script="Sora" typeface="Nirmala UI"/>
-        <a:font script="Tale" typeface="Microsoft Tai Le"/>
-        <a:font script="Talu" typeface="Microsoft New Tai Lue"/>
-        <a:font script="Tfng" typeface="Ebrima"/>
       </a:minorFont>
     </a:fontScheme>
-    <a:fmtScheme name="Office">
+    <a:fmtScheme name="Office Theme">
       <a:fillStyleLst>
         <a:solidFill>
           <a:schemeClr val="phClr"/>
@@ -3835,7 +3665,7 @@
   <a:extraClrSchemeLst/>
   <a:extLst>
     <a:ext uri="{05A4C25C-085E-4340-85A3-A5531E510DB2}">
-      <thm15:themeFamily xmlns:thm15="http://schemas.microsoft.com/office/thememl/2012/main" name="Office Theme" id="{62F939B6-93AF-4DB8-9C6B-D6C7DFDC589F}" vid="{4A3C46E8-61CC-4603-A589-7422A47A8E4A}"/>
+      <thm15:themeFamily xmlns:thm15="http://schemas.microsoft.com/office/thememl/2012/main" name="Office 2013 - 2022 Theme" id="{62F939B6-93AF-4DB8-9C6B-D6C7DFDC589F}" vid="{4A3C46E8-61CC-4603-A589-7422A47A8E4A}"/>
     </a:ext>
   </a:extLst>
 </a:theme>

</xml_diff>